<commit_message>
Updated to the latest changes
</commit_message>
<xml_diff>
--- a/Geneious_workflow/01_sample_ID_QC/files/AMD_ID_create_key.pptx
+++ b/Geneious_workflow/01_sample_ID_QC/files/AMD_ID_create_key.pptx
@@ -264,7 +264,7 @@
           <a:p>
             <a:fld id="{A4490DC8-1743-4A78-BDBF-D392747EBEB2}" type="datetimeFigureOut">
               <a:rPr lang="en-US" smtClean="0"/>
-              <a:t>4/8/22</a:t>
+              <a:t>4/19/2023</a:t>
             </a:fld>
             <a:endParaRPr lang="en-US"/>
           </a:p>
@@ -1032,7 +1032,7 @@
           <a:p>
             <a:fld id="{1D82E91C-34B8-4AF3-BD15-DDFCBC11B226}" type="datetimeFigureOut">
               <a:rPr lang="en-US" smtClean="0"/>
-              <a:t>4/8/22</a:t>
+              <a:t>4/19/2023</a:t>
             </a:fld>
             <a:endParaRPr lang="en-US"/>
           </a:p>
@@ -1209,7 +1209,7 @@
           <a:p>
             <a:fld id="{1D82E91C-34B8-4AF3-BD15-DDFCBC11B226}" type="datetimeFigureOut">
               <a:rPr lang="en-US" smtClean="0"/>
-              <a:t>4/8/22</a:t>
+              <a:t>4/19/2023</a:t>
             </a:fld>
             <a:endParaRPr lang="en-US"/>
           </a:p>
@@ -1389,7 +1389,7 @@
           <a:p>
             <a:fld id="{1D82E91C-34B8-4AF3-BD15-DDFCBC11B226}" type="datetimeFigureOut">
               <a:rPr lang="en-US" smtClean="0"/>
-              <a:t>4/8/22</a:t>
+              <a:t>4/19/2023</a:t>
             </a:fld>
             <a:endParaRPr lang="en-US"/>
           </a:p>
@@ -1559,7 +1559,7 @@
           <a:p>
             <a:fld id="{1D82E91C-34B8-4AF3-BD15-DDFCBC11B226}" type="datetimeFigureOut">
               <a:rPr lang="en-US" smtClean="0"/>
-              <a:t>4/8/22</a:t>
+              <a:t>4/19/2023</a:t>
             </a:fld>
             <a:endParaRPr lang="en-US"/>
           </a:p>
@@ -1880,7 +1880,7 @@
           <a:p>
             <a:fld id="{1D82E91C-34B8-4AF3-BD15-DDFCBC11B226}" type="datetimeFigureOut">
               <a:rPr lang="en-US" smtClean="0"/>
-              <a:t>4/8/22</a:t>
+              <a:t>4/19/2023</a:t>
             </a:fld>
             <a:endParaRPr lang="en-US"/>
           </a:p>
@@ -2340,7 +2340,7 @@
           <a:p>
             <a:fld id="{1D82E91C-34B8-4AF3-BD15-DDFCBC11B226}" type="datetimeFigureOut">
               <a:rPr lang="en-US" smtClean="0"/>
-              <a:t>4/8/22</a:t>
+              <a:t>4/19/2023</a:t>
             </a:fld>
             <a:endParaRPr lang="en-US"/>
           </a:p>
@@ -2751,7 +2751,7 @@
           <a:p>
             <a:fld id="{1D82E91C-34B8-4AF3-BD15-DDFCBC11B226}" type="datetimeFigureOut">
               <a:rPr lang="en-US" smtClean="0"/>
-              <a:t>4/8/22</a:t>
+              <a:t>4/19/2023</a:t>
             </a:fld>
             <a:endParaRPr lang="en-US"/>
           </a:p>
@@ -2869,7 +2869,7 @@
           <a:p>
             <a:fld id="{1D82E91C-34B8-4AF3-BD15-DDFCBC11B226}" type="datetimeFigureOut">
               <a:rPr lang="en-US" smtClean="0"/>
-              <a:t>4/8/22</a:t>
+              <a:t>4/19/2023</a:t>
             </a:fld>
             <a:endParaRPr lang="en-US"/>
           </a:p>
@@ -2986,7 +2986,7 @@
           <a:p>
             <a:fld id="{1D82E91C-34B8-4AF3-BD15-DDFCBC11B226}" type="datetimeFigureOut">
               <a:rPr lang="en-US" smtClean="0"/>
-              <a:t>4/8/22</a:t>
+              <a:t>4/19/2023</a:t>
             </a:fld>
             <a:endParaRPr lang="en-US"/>
           </a:p>
@@ -3344,7 +3344,7 @@
           <a:p>
             <a:fld id="{1D82E91C-34B8-4AF3-BD15-DDFCBC11B226}" type="datetimeFigureOut">
               <a:rPr lang="en-US" smtClean="0"/>
-              <a:t>4/8/22</a:t>
+              <a:t>4/19/2023</a:t>
             </a:fld>
             <a:endParaRPr lang="en-US"/>
           </a:p>
@@ -3851,7 +3851,7 @@
           <a:p>
             <a:fld id="{1D82E91C-34B8-4AF3-BD15-DDFCBC11B226}" type="datetimeFigureOut">
               <a:rPr lang="en-US" smtClean="0"/>
-              <a:t>4/8/22</a:t>
+              <a:t>4/19/2023</a:t>
             </a:fld>
             <a:endParaRPr lang="en-US"/>
           </a:p>
@@ -4206,7 +4206,7 @@
           <a:p>
             <a:fld id="{1D82E91C-34B8-4AF3-BD15-DDFCBC11B226}" type="datetimeFigureOut">
               <a:rPr lang="en-US" smtClean="0"/>
-              <a:t>4/8/22</a:t>
+              <a:t>4/19/2023</a:t>
             </a:fld>
             <a:endParaRPr lang="en-US"/>
           </a:p>
@@ -8089,10 +8089,10 @@
       </p:sp>
       <p:graphicFrame>
         <p:nvGraphicFramePr>
-          <p:cNvPr id="4" name="Table 3">
+          <p:cNvPr id="3" name="Table 2">
             <a:extLst>
               <a:ext uri="{FF2B5EF4-FFF2-40B4-BE49-F238E27FC236}">
-                <a16:creationId xmlns:a16="http://schemas.microsoft.com/office/drawing/2014/main" id="{41EFD224-5CF5-8A4C-A34F-94623390BBA4}"/>
+                <a16:creationId xmlns:a16="http://schemas.microsoft.com/office/drawing/2014/main" id="{CD4BDAC6-0A9F-B07D-BB34-048D26B7B4D2}"/>
               </a:ext>
             </a:extLst>
           </p:cNvPr>
@@ -8102,1383 +8102,1830 @@
           <p:nvPr>
             <p:extLst>
               <p:ext uri="{D42A27DB-BD31-4B8C-83A1-F6EECF244321}">
-                <p14:modId xmlns:p14="http://schemas.microsoft.com/office/powerpoint/2010/main" val="2095199913"/>
+                <p14:modId xmlns:p14="http://schemas.microsoft.com/office/powerpoint/2010/main" val="1906534011"/>
               </p:ext>
             </p:extLst>
           </p:nvPr>
         </p:nvGraphicFramePr>
         <p:xfrm>
-          <a:off x="5671868" y="115019"/>
-          <a:ext cx="5230580" cy="6511320"/>
+          <a:off x="6096000" y="12867"/>
+          <a:ext cx="5107757" cy="6845124"/>
         </p:xfrm>
         <a:graphic>
           <a:graphicData uri="http://schemas.openxmlformats.org/drawingml/2006/table">
             <a:tbl>
               <a:tblPr firstRow="1" bandRow="1">
-                <a:tableStyleId>{9D7B26C5-4107-4FEC-AEDC-1716B250A1EF}</a:tableStyleId>
+                <a:tableStyleId>{5C22544A-7EE6-4342-B048-85BDC9FD1C3A}</a:tableStyleId>
               </a:tblPr>
               <a:tblGrid>
-                <a:gridCol w="4534323">
+                <a:gridCol w="4429190">
                   <a:extLst>
                     <a:ext uri="{9D8B030D-6E8A-4147-A177-3AD203B41FA5}">
-                      <a16:colId xmlns:a16="http://schemas.microsoft.com/office/drawing/2014/main" val="795987219"/>
+                      <a16:colId xmlns:a16="http://schemas.microsoft.com/office/drawing/2014/main" val="768803286"/>
                     </a:ext>
                   </a:extLst>
                 </a:gridCol>
-                <a:gridCol w="696257">
+                <a:gridCol w="678567">
                   <a:extLst>
                     <a:ext uri="{9D8B030D-6E8A-4147-A177-3AD203B41FA5}">
-                      <a16:colId xmlns:a16="http://schemas.microsoft.com/office/drawing/2014/main" val="1011061716"/>
+                      <a16:colId xmlns:a16="http://schemas.microsoft.com/office/drawing/2014/main" val="365520770"/>
                     </a:ext>
                   </a:extLst>
                 </a:gridCol>
               </a:tblGrid>
-              <a:tr h="260510">
+              <a:tr h="255264">
                 <a:tc>
                   <a:txBody>
                     <a:bodyPr/>
                     <a:lstStyle/>
                     <a:p>
-                      <a:r>
-                        <a:rPr lang="en-US" sz="1100" dirty="0"/>
+                      <a:pPr marL="0" algn="l" rtl="0" eaLnBrk="1" latinLnBrk="0" hangingPunct="1">
+                        <a:spcBef>
+                          <a:spcPts val="0"/>
+                        </a:spcBef>
+                        <a:spcAft>
+                          <a:spcPts val="0"/>
+                        </a:spcAft>
+                      </a:pPr>
+                      <a:r>
+                        <a:rPr lang="en-US" sz="1100" kern="1200" dirty="0">
+                          <a:effectLst/>
+                        </a:rPr>
                         <a:t>Treatment</a:t>
                       </a:r>
+                      <a:endParaRPr lang="en-US" sz="1700" dirty="0">
+                        <a:effectLst/>
+                      </a:endParaRPr>
                     </a:p>
                   </a:txBody>
-                  <a:tcPr/>
+                  <a:tcPr marL="0" marR="0" marT="0" marB="0" anchor="ctr"/>
                 </a:tc>
                 <a:tc>
                   <a:txBody>
                     <a:bodyPr/>
                     <a:lstStyle/>
                     <a:p>
-                      <a:pPr algn="ctr"/>
-                      <a:r>
-                        <a:rPr lang="en-US" sz="1100" b="1" dirty="0">
-                          <a:solidFill>
-                            <a:srgbClr val="002060"/>
-                          </a:solidFill>
+                      <a:pPr marL="0" algn="ctr" rtl="0" eaLnBrk="1" latinLnBrk="0" hangingPunct="1">
+                        <a:spcBef>
+                          <a:spcPts val="0"/>
+                        </a:spcBef>
+                        <a:spcAft>
+                          <a:spcPts val="0"/>
+                        </a:spcAft>
+                      </a:pPr>
+                      <a:r>
+                        <a:rPr lang="en-US" sz="1100" kern="1200" dirty="0">
+                          <a:effectLst/>
                         </a:rPr>
                         <a:t>Code </a:t>
                       </a:r>
+                      <a:endParaRPr lang="en-US" sz="1700" dirty="0">
+                        <a:effectLst/>
+                      </a:endParaRPr>
                     </a:p>
                   </a:txBody>
-                  <a:tcPr/>
+                  <a:tcPr marL="0" marR="0" marT="0" marB="0" anchor="ctr"/>
                 </a:tc>
                 <a:extLst>
                   <a:ext uri="{0D108BD9-81ED-4DB2-BD59-A6C34878D82A}">
-                    <a16:rowId xmlns:a16="http://schemas.microsoft.com/office/drawing/2014/main" val="2499108853"/>
+                    <a16:rowId xmlns:a16="http://schemas.microsoft.com/office/drawing/2014/main" val="946864303"/>
                   </a:ext>
                 </a:extLst>
               </a:tr>
-              <a:tr h="260510">
+              <a:tr h="255264">
                 <a:tc>
                   <a:txBody>
                     <a:bodyPr/>
                     <a:lstStyle/>
                     <a:p>
-                      <a:pPr marL="0" marR="0" lvl="0" indent="0" algn="l" defTabSz="914400" rtl="0" eaLnBrk="1" fontAlgn="auto" latinLnBrk="0" hangingPunct="1">
-                        <a:lnSpc>
-                          <a:spcPct val="100000"/>
-                        </a:lnSpc>
+                      <a:pPr marL="0" marR="0" indent="0" algn="l" rtl="0" eaLnBrk="1" fontAlgn="auto" latinLnBrk="0" hangingPunct="1">
                         <a:spcBef>
                           <a:spcPts val="0"/>
                         </a:spcBef>
                         <a:spcAft>
                           <a:spcPts val="0"/>
                         </a:spcAft>
-                        <a:buClrTx/>
-                        <a:buSzTx/>
-                        <a:buFontTx/>
-                        <a:buNone/>
-                        <a:tabLst/>
-                        <a:defRPr/>
                       </a:pPr>
                       <a:r>
-                        <a:rPr lang="en-US" sz="1100" dirty="0"/>
-                        <a:t>Arthemether-Lumafantrine (AL)- Coartem</a:t>
-                      </a:r>
+                        <a:rPr lang="en-US" sz="1100" kern="1200" dirty="0" err="1">
+                          <a:effectLst/>
+                        </a:rPr>
+                        <a:t>Arthemether-Lumafantrine</a:t>
+                      </a:r>
+                      <a:r>
+                        <a:rPr lang="en-US" sz="1100" kern="1200" dirty="0">
+                          <a:effectLst/>
+                        </a:rPr>
+                        <a:t> (AL)- </a:t>
+                      </a:r>
+                      <a:r>
+                        <a:rPr lang="en-US" sz="1100" kern="1200" dirty="0" err="1">
+                          <a:effectLst/>
+                        </a:rPr>
+                        <a:t>Coartem</a:t>
+                      </a:r>
+                      <a:endParaRPr lang="en-US" sz="1700" dirty="0" err="1">
+                        <a:effectLst/>
+                      </a:endParaRPr>
                     </a:p>
                   </a:txBody>
-                  <a:tcPr/>
+                  <a:tcPr marL="0" marR="0" marT="0" marB="0" anchor="ctr"/>
                 </a:tc>
                 <a:tc>
                   <a:txBody>
                     <a:bodyPr/>
                     <a:lstStyle/>
                     <a:p>
-                      <a:pPr algn="ctr"/>
-                      <a:r>
-                        <a:rPr lang="en-US" sz="1100" b="1" dirty="0">
-                          <a:solidFill>
-                            <a:srgbClr val="002060"/>
-                          </a:solidFill>
+                      <a:pPr marL="0" algn="ctr" rtl="0" eaLnBrk="1" latinLnBrk="0" hangingPunct="1">
+                        <a:spcBef>
+                          <a:spcPts val="0"/>
+                        </a:spcBef>
+                        <a:spcAft>
+                          <a:spcPts val="0"/>
+                        </a:spcAft>
+                      </a:pPr>
+                      <a:r>
+                        <a:rPr lang="en-US" sz="1100" kern="1200" dirty="0">
+                          <a:effectLst/>
                         </a:rPr>
                         <a:t>A</a:t>
                       </a:r>
+                      <a:endParaRPr lang="en-US" sz="1700" dirty="0">
+                        <a:effectLst/>
+                      </a:endParaRPr>
                     </a:p>
                   </a:txBody>
-                  <a:tcPr/>
+                  <a:tcPr marL="0" marR="0" marT="0" marB="0" anchor="ctr"/>
                 </a:tc>
                 <a:extLst>
                   <a:ext uri="{0D108BD9-81ED-4DB2-BD59-A6C34878D82A}">
-                    <a16:rowId xmlns:a16="http://schemas.microsoft.com/office/drawing/2014/main" val="3357816397"/>
+                    <a16:rowId xmlns:a16="http://schemas.microsoft.com/office/drawing/2014/main" val="1739880238"/>
                   </a:ext>
                 </a:extLst>
               </a:tr>
-              <a:tr h="260510">
+              <a:tr h="266862">
                 <a:tc>
                   <a:txBody>
                     <a:bodyPr/>
                     <a:lstStyle/>
                     <a:p>
-                      <a:pPr marL="0" marR="0" lvl="0" indent="0" algn="l" rtl="0" eaLnBrk="1" fontAlgn="auto" latinLnBrk="0" hangingPunct="1">
-                        <a:lnSpc>
-                          <a:spcPct val="100000"/>
-                        </a:lnSpc>
+                      <a:pPr marL="0" marR="0" indent="0" algn="l" rtl="0" eaLnBrk="1" fontAlgn="auto" latinLnBrk="0" hangingPunct="1">
                         <a:spcBef>
                           <a:spcPts val="0"/>
                         </a:spcBef>
                         <a:spcAft>
                           <a:spcPts val="0"/>
                         </a:spcAft>
-                        <a:buClrTx/>
-                        <a:buSzTx/>
-                        <a:buFontTx/>
-                        <a:buNone/>
                       </a:pPr>
                       <a:r>
-                        <a:rPr lang="en-US" sz="1100" dirty="0"/>
+                        <a:rPr lang="en-US" sz="1100" kern="1200" dirty="0">
+                          <a:effectLst/>
+                        </a:rPr>
                         <a:t>Chloroquine (CQ) </a:t>
                       </a:r>
+                      <a:endParaRPr lang="en-US" sz="1700" dirty="0">
+                        <a:effectLst/>
+                      </a:endParaRPr>
                     </a:p>
                   </a:txBody>
-                  <a:tcPr/>
+                  <a:tcPr marL="0" marR="0" marT="0" marB="0" anchor="ctr"/>
                 </a:tc>
                 <a:tc>
                   <a:txBody>
                     <a:bodyPr/>
                     <a:lstStyle/>
                     <a:p>
-                      <a:pPr algn="ctr"/>
-                      <a:r>
-                        <a:rPr lang="en-US" sz="1100" b="1" dirty="0">
-                          <a:solidFill>
-                            <a:srgbClr val="002060"/>
-                          </a:solidFill>
+                      <a:pPr marL="0" algn="ctr" rtl="0" eaLnBrk="1" latinLnBrk="0" hangingPunct="1">
+                        <a:spcBef>
+                          <a:spcPts val="0"/>
+                        </a:spcBef>
+                        <a:spcAft>
+                          <a:spcPts val="0"/>
+                        </a:spcAft>
+                      </a:pPr>
+                      <a:r>
+                        <a:rPr lang="en-US" sz="1100" kern="1200" dirty="0">
+                          <a:effectLst/>
                         </a:rPr>
                         <a:t>B</a:t>
                       </a:r>
+                      <a:endParaRPr lang="en-US" sz="1700" dirty="0">
+                        <a:effectLst/>
+                      </a:endParaRPr>
                     </a:p>
                   </a:txBody>
-                  <a:tcPr/>
+                  <a:tcPr marL="0" marR="0" marT="0" marB="0" anchor="ctr"/>
                 </a:tc>
                 <a:extLst>
                   <a:ext uri="{0D108BD9-81ED-4DB2-BD59-A6C34878D82A}">
-                    <a16:rowId xmlns:a16="http://schemas.microsoft.com/office/drawing/2014/main" val="1485742819"/>
+                    <a16:rowId xmlns:a16="http://schemas.microsoft.com/office/drawing/2014/main" val="68028904"/>
                   </a:ext>
                 </a:extLst>
               </a:tr>
-              <a:tr h="260510">
+              <a:tr h="255264">
                 <a:tc>
                   <a:txBody>
                     <a:bodyPr/>
                     <a:lstStyle/>
                     <a:p>
-                      <a:pPr marL="0" marR="0" lvl="0" indent="0" algn="l" rtl="0" eaLnBrk="1" fontAlgn="auto" latinLnBrk="0" hangingPunct="1">
-                        <a:lnSpc>
-                          <a:spcPct val="100000"/>
-                        </a:lnSpc>
+                      <a:pPr marL="0" marR="0" indent="0" algn="l" rtl="0" eaLnBrk="1" fontAlgn="auto" latinLnBrk="0" hangingPunct="1">
                         <a:spcBef>
                           <a:spcPts val="0"/>
                         </a:spcBef>
                         <a:spcAft>
                           <a:spcPts val="0"/>
                         </a:spcAft>
-                        <a:buClrTx/>
-                        <a:buSzTx/>
-                        <a:buFontTx/>
-                        <a:buNone/>
                       </a:pPr>
                       <a:r>
-                        <a:rPr lang="en-US" sz="1100" dirty="0"/>
+                        <a:rPr lang="en-US" sz="1100" kern="1200" dirty="0">
+                          <a:effectLst/>
+                        </a:rPr>
                         <a:t>Chloroquine + Piperaquine (CQ+PQ) </a:t>
                       </a:r>
+                      <a:endParaRPr lang="en-US" sz="1700" dirty="0">
+                        <a:effectLst/>
+                      </a:endParaRPr>
                     </a:p>
                   </a:txBody>
-                  <a:tcPr/>
+                  <a:tcPr marL="0" marR="0" marT="0" marB="0" anchor="ctr"/>
                 </a:tc>
                 <a:tc>
                   <a:txBody>
                     <a:bodyPr/>
                     <a:lstStyle/>
                     <a:p>
-                      <a:pPr algn="ctr"/>
-                      <a:r>
-                        <a:rPr lang="en-US" sz="1100" b="1" dirty="0">
-                          <a:solidFill>
-                            <a:srgbClr val="002060"/>
-                          </a:solidFill>
+                      <a:pPr marL="0" algn="ctr" rtl="0" eaLnBrk="1" latinLnBrk="0" hangingPunct="1">
+                        <a:spcBef>
+                          <a:spcPts val="0"/>
+                        </a:spcBef>
+                        <a:spcAft>
+                          <a:spcPts val="0"/>
+                        </a:spcAft>
+                      </a:pPr>
+                      <a:r>
+                        <a:rPr lang="en-US" sz="1100" kern="1200" dirty="0">
+                          <a:effectLst/>
                         </a:rPr>
                         <a:t>C</a:t>
                       </a:r>
+                      <a:endParaRPr lang="en-US" sz="1700" dirty="0">
+                        <a:effectLst/>
+                      </a:endParaRPr>
                     </a:p>
                   </a:txBody>
-                  <a:tcPr/>
+                  <a:tcPr marL="0" marR="0" marT="0" marB="0" anchor="ctr"/>
                 </a:tc>
                 <a:extLst>
                   <a:ext uri="{0D108BD9-81ED-4DB2-BD59-A6C34878D82A}">
-                    <a16:rowId xmlns:a16="http://schemas.microsoft.com/office/drawing/2014/main" val="653405830"/>
+                    <a16:rowId xmlns:a16="http://schemas.microsoft.com/office/drawing/2014/main" val="2366926654"/>
                   </a:ext>
                 </a:extLst>
               </a:tr>
-              <a:tr h="260510">
+              <a:tr h="255264">
                 <a:tc>
                   <a:txBody>
                     <a:bodyPr/>
                     <a:lstStyle/>
                     <a:p>
-                      <a:pPr marL="0" marR="0" lvl="0" indent="0" algn="l" defTabSz="914400" rtl="0" eaLnBrk="1" fontAlgn="auto" latinLnBrk="0" hangingPunct="1">
-                        <a:lnSpc>
-                          <a:spcPct val="100000"/>
-                        </a:lnSpc>
+                      <a:pPr marL="0" marR="0" indent="0" algn="l" rtl="0" eaLnBrk="1" fontAlgn="auto" latinLnBrk="0" hangingPunct="1">
                         <a:spcBef>
                           <a:spcPts val="0"/>
                         </a:spcBef>
                         <a:spcAft>
                           <a:spcPts val="0"/>
                         </a:spcAft>
-                        <a:buClrTx/>
-                        <a:buSzTx/>
-                        <a:buFontTx/>
-                        <a:buNone/>
-                        <a:tabLst/>
-                        <a:defRPr/>
                       </a:pPr>
                       <a:r>
-                        <a:rPr lang="en-US" sz="1100" dirty="0"/>
-                        <a:t>Arthemether-Lumafantrine + Piperaquine (AL+PQ)</a:t>
-                      </a:r>
+                        <a:rPr lang="en-US" sz="1100" kern="1200" dirty="0" err="1">
+                          <a:effectLst/>
+                        </a:rPr>
+                        <a:t>Arthemether-Lumafantrine</a:t>
+                      </a:r>
+                      <a:r>
+                        <a:rPr lang="en-US" sz="1100" kern="1200" dirty="0">
+                          <a:effectLst/>
+                        </a:rPr>
+                        <a:t> + Piperaquine (AL+PQ)</a:t>
+                      </a:r>
+                      <a:endParaRPr lang="en-US" sz="1700" dirty="0">
+                        <a:effectLst/>
+                      </a:endParaRPr>
                     </a:p>
                   </a:txBody>
-                  <a:tcPr/>
+                  <a:tcPr marL="0" marR="0" marT="0" marB="0" anchor="ctr"/>
                 </a:tc>
                 <a:tc>
                   <a:txBody>
                     <a:bodyPr/>
                     <a:lstStyle/>
                     <a:p>
-                      <a:pPr algn="ctr"/>
-                      <a:r>
-                        <a:rPr lang="en-US" sz="1100" b="1" dirty="0">
-                          <a:solidFill>
-                            <a:srgbClr val="002060"/>
-                          </a:solidFill>
+                      <a:pPr marL="0" algn="ctr" rtl="0" eaLnBrk="1" latinLnBrk="0" hangingPunct="1">
+                        <a:spcBef>
+                          <a:spcPts val="0"/>
+                        </a:spcBef>
+                        <a:spcAft>
+                          <a:spcPts val="0"/>
+                        </a:spcAft>
+                      </a:pPr>
+                      <a:r>
+                        <a:rPr lang="en-US" sz="1100" kern="1200" dirty="0">
+                          <a:effectLst/>
                         </a:rPr>
                         <a:t>D</a:t>
                       </a:r>
+                      <a:endParaRPr lang="en-US" sz="1700" dirty="0">
+                        <a:effectLst/>
+                      </a:endParaRPr>
                     </a:p>
                   </a:txBody>
-                  <a:tcPr/>
+                  <a:tcPr marL="0" marR="0" marT="0" marB="0" anchor="ctr"/>
                 </a:tc>
                 <a:extLst>
                   <a:ext uri="{0D108BD9-81ED-4DB2-BD59-A6C34878D82A}">
-                    <a16:rowId xmlns:a16="http://schemas.microsoft.com/office/drawing/2014/main" val="4212846983"/>
+                    <a16:rowId xmlns:a16="http://schemas.microsoft.com/office/drawing/2014/main" val="3174171082"/>
                   </a:ext>
                 </a:extLst>
               </a:tr>
-              <a:tr h="260510">
+              <a:tr h="255264">
                 <a:tc>
                   <a:txBody>
                     <a:bodyPr/>
                     <a:lstStyle/>
                     <a:p>
-                      <a:pPr marL="0" marR="0" lvl="0" indent="0" algn="l" rtl="0" eaLnBrk="1" fontAlgn="auto" latinLnBrk="0" hangingPunct="1">
-                        <a:lnSpc>
-                          <a:spcPct val="100000"/>
-                        </a:lnSpc>
+                      <a:pPr marL="0" marR="0" indent="0" algn="l" rtl="0" eaLnBrk="1" fontAlgn="auto" latinLnBrk="0" hangingPunct="1">
                         <a:spcBef>
                           <a:spcPts val="0"/>
                         </a:spcBef>
                         <a:spcAft>
                           <a:spcPts val="0"/>
                         </a:spcAft>
-                        <a:buClrTx/>
-                        <a:buSzTx/>
-                        <a:buFontTx/>
-                        <a:buNone/>
                       </a:pPr>
                       <a:r>
-                        <a:rPr lang="en-US" sz="1100" dirty="0"/>
-                        <a:t>Arthemether + Mefloquine(Lariam) (AL+MQ) </a:t>
-                      </a:r>
+                        <a:rPr lang="en-US" sz="1100" kern="1200" dirty="0" err="1">
+                          <a:effectLst/>
+                        </a:rPr>
+                        <a:t>Arthemether</a:t>
+                      </a:r>
+                      <a:r>
+                        <a:rPr lang="en-US" sz="1100" kern="1200" dirty="0">
+                          <a:effectLst/>
+                        </a:rPr>
+                        <a:t> + Mefloquine(</a:t>
+                      </a:r>
+                      <a:r>
+                        <a:rPr lang="en-US" sz="1100" kern="1200" dirty="0" err="1">
+                          <a:effectLst/>
+                        </a:rPr>
+                        <a:t>Lariam</a:t>
+                      </a:r>
+                      <a:r>
+                        <a:rPr lang="en-US" sz="1100" kern="1200" dirty="0">
+                          <a:effectLst/>
+                        </a:rPr>
+                        <a:t>) (AL+MQ) </a:t>
+                      </a:r>
+                      <a:endParaRPr lang="en-US" sz="1700" dirty="0">
+                        <a:effectLst/>
+                      </a:endParaRPr>
                     </a:p>
                   </a:txBody>
-                  <a:tcPr/>
+                  <a:tcPr marL="0" marR="0" marT="0" marB="0" anchor="ctr"/>
                 </a:tc>
                 <a:tc>
                   <a:txBody>
                     <a:bodyPr/>
                     <a:lstStyle/>
                     <a:p>
-                      <a:pPr algn="ctr"/>
-                      <a:r>
-                        <a:rPr lang="en-US" sz="1100" b="1" dirty="0">
-                          <a:solidFill>
-                            <a:srgbClr val="002060"/>
-                          </a:solidFill>
+                      <a:pPr marL="0" algn="ctr" rtl="0" eaLnBrk="1" latinLnBrk="0" hangingPunct="1">
+                        <a:spcBef>
+                          <a:spcPts val="0"/>
+                        </a:spcBef>
+                        <a:spcAft>
+                          <a:spcPts val="0"/>
+                        </a:spcAft>
+                      </a:pPr>
+                      <a:r>
+                        <a:rPr lang="en-US" sz="1100" kern="1200" dirty="0">
+                          <a:effectLst/>
                         </a:rPr>
                         <a:t>E</a:t>
                       </a:r>
+                      <a:endParaRPr lang="en-US" sz="1700" dirty="0">
+                        <a:effectLst/>
+                      </a:endParaRPr>
                     </a:p>
                   </a:txBody>
-                  <a:tcPr/>
+                  <a:tcPr marL="0" marR="0" marT="0" marB="0" anchor="ctr"/>
                 </a:tc>
                 <a:extLst>
                   <a:ext uri="{0D108BD9-81ED-4DB2-BD59-A6C34878D82A}">
-                    <a16:rowId xmlns:a16="http://schemas.microsoft.com/office/drawing/2014/main" val="3787257509"/>
+                    <a16:rowId xmlns:a16="http://schemas.microsoft.com/office/drawing/2014/main" val="507876035"/>
                   </a:ext>
                 </a:extLst>
               </a:tr>
-              <a:tr h="260510">
+              <a:tr h="255264">
                 <a:tc>
                   <a:txBody>
                     <a:bodyPr/>
                     <a:lstStyle/>
                     <a:p>
-                      <a:pPr marL="0" marR="0" lvl="0" indent="0" algn="l" defTabSz="914400" rtl="0" eaLnBrk="1" fontAlgn="auto" latinLnBrk="0" hangingPunct="1">
-                        <a:lnSpc>
-                          <a:spcPct val="100000"/>
-                        </a:lnSpc>
+                      <a:pPr marL="0" marR="0" indent="0" algn="l" rtl="0" eaLnBrk="1" fontAlgn="auto" latinLnBrk="0" hangingPunct="1">
                         <a:spcBef>
                           <a:spcPts val="0"/>
                         </a:spcBef>
                         <a:spcAft>
                           <a:spcPts val="0"/>
                         </a:spcAft>
-                        <a:buClrTx/>
-                        <a:buSzTx/>
-                        <a:buFontTx/>
-                        <a:buNone/>
-                        <a:tabLst/>
-                        <a:defRPr/>
                       </a:pPr>
                       <a:r>
-                        <a:rPr lang="en-US" sz="1100" dirty="0"/>
+                        <a:rPr lang="en-US" sz="1100" kern="1200" dirty="0">
+                          <a:effectLst/>
+                        </a:rPr>
                         <a:t>Artesunate + Amodiaquine (AS+AQ)</a:t>
                       </a:r>
+                      <a:endParaRPr lang="en-US" sz="1700" dirty="0">
+                        <a:effectLst/>
+                      </a:endParaRPr>
                     </a:p>
                   </a:txBody>
-                  <a:tcPr/>
+                  <a:tcPr marL="0" marR="0" marT="0" marB="0" anchor="ctr"/>
                 </a:tc>
                 <a:tc>
                   <a:txBody>
                     <a:bodyPr/>
                     <a:lstStyle/>
                     <a:p>
-                      <a:pPr algn="ctr"/>
-                      <a:r>
-                        <a:rPr lang="en-US" sz="1100" b="1" dirty="0">
-                          <a:solidFill>
-                            <a:srgbClr val="002060"/>
-                          </a:solidFill>
+                      <a:pPr marL="0" algn="ctr" rtl="0" eaLnBrk="1" latinLnBrk="0" hangingPunct="1">
+                        <a:spcBef>
+                          <a:spcPts val="0"/>
+                        </a:spcBef>
+                        <a:spcAft>
+                          <a:spcPts val="0"/>
+                        </a:spcAft>
+                      </a:pPr>
+                      <a:r>
+                        <a:rPr lang="en-US" sz="1100" kern="1200" dirty="0">
+                          <a:effectLst/>
                         </a:rPr>
                         <a:t>F</a:t>
                       </a:r>
+                      <a:endParaRPr lang="en-US" sz="1700" dirty="0">
+                        <a:effectLst/>
+                      </a:endParaRPr>
                     </a:p>
                   </a:txBody>
-                  <a:tcPr/>
+                  <a:tcPr marL="0" marR="0" marT="0" marB="0" anchor="ctr"/>
                 </a:tc>
                 <a:extLst>
                   <a:ext uri="{0D108BD9-81ED-4DB2-BD59-A6C34878D82A}">
-                    <a16:rowId xmlns:a16="http://schemas.microsoft.com/office/drawing/2014/main" val="2378225384"/>
+                    <a16:rowId xmlns:a16="http://schemas.microsoft.com/office/drawing/2014/main" val="756217401"/>
                   </a:ext>
                 </a:extLst>
               </a:tr>
-              <a:tr h="260510">
+              <a:tr h="255264">
                 <a:tc>
                   <a:txBody>
                     <a:bodyPr/>
                     <a:lstStyle/>
                     <a:p>
-                      <a:pPr marL="0" marR="0" lvl="0" indent="0" algn="l" defTabSz="914400" rtl="0" eaLnBrk="1" fontAlgn="auto" latinLnBrk="0" hangingPunct="1">
-                        <a:lnSpc>
-                          <a:spcPct val="100000"/>
-                        </a:lnSpc>
+                      <a:pPr marL="0" marR="0" indent="0" algn="l" rtl="0" eaLnBrk="1" fontAlgn="auto" latinLnBrk="0" hangingPunct="1">
                         <a:spcBef>
                           <a:spcPts val="0"/>
                         </a:spcBef>
                         <a:spcAft>
                           <a:spcPts val="0"/>
                         </a:spcAft>
-                        <a:buClrTx/>
-                        <a:buSzTx/>
-                        <a:buFontTx/>
-                        <a:buNone/>
-                        <a:tabLst/>
-                        <a:defRPr/>
                       </a:pPr>
                       <a:r>
-                        <a:rPr lang="en-US" sz="1100" dirty="0"/>
-                        <a:t>Artesunate + Sulphadoxine-Pyrimethamine (AS+SP)</a:t>
-                      </a:r>
+                        <a:rPr lang="en-US" sz="1100" kern="1200" dirty="0">
+                          <a:effectLst/>
+                        </a:rPr>
+                        <a:t>Artesunate + </a:t>
+                      </a:r>
+                      <a:r>
+                        <a:rPr lang="en-US" sz="1100" kern="1200" dirty="0" err="1">
+                          <a:effectLst/>
+                        </a:rPr>
+                        <a:t>Sulfadoxine</a:t>
+                      </a:r>
+                      <a:r>
+                        <a:rPr lang="en-US" sz="1100" kern="1200" dirty="0">
+                          <a:effectLst/>
+                        </a:rPr>
+                        <a:t>-Pyrimethamine (AS+SP)</a:t>
+                      </a:r>
+                      <a:endParaRPr lang="en-US" sz="1700" dirty="0">
+                        <a:effectLst/>
+                      </a:endParaRPr>
                     </a:p>
                   </a:txBody>
-                  <a:tcPr/>
+                  <a:tcPr marL="0" marR="0" marT="0" marB="0" anchor="ctr"/>
                 </a:tc>
                 <a:tc>
                   <a:txBody>
                     <a:bodyPr/>
                     <a:lstStyle/>
                     <a:p>
-                      <a:pPr algn="ctr"/>
-                      <a:r>
-                        <a:rPr lang="en-US" sz="1100" b="1" dirty="0">
-                          <a:solidFill>
-                            <a:srgbClr val="002060"/>
-                          </a:solidFill>
+                      <a:pPr marL="0" algn="ctr" rtl="0" eaLnBrk="1" latinLnBrk="0" hangingPunct="1">
+                        <a:spcBef>
+                          <a:spcPts val="0"/>
+                        </a:spcBef>
+                        <a:spcAft>
+                          <a:spcPts val="0"/>
+                        </a:spcAft>
+                      </a:pPr>
+                      <a:r>
+                        <a:rPr lang="en-US" sz="1100" kern="1200" dirty="0">
+                          <a:effectLst/>
                         </a:rPr>
                         <a:t>G</a:t>
                       </a:r>
+                      <a:endParaRPr lang="en-US" sz="1700" dirty="0">
+                        <a:effectLst/>
+                      </a:endParaRPr>
                     </a:p>
                   </a:txBody>
-                  <a:tcPr/>
+                  <a:tcPr marL="0" marR="0" marT="0" marB="0" anchor="ctr"/>
                 </a:tc>
                 <a:extLst>
                   <a:ext uri="{0D108BD9-81ED-4DB2-BD59-A6C34878D82A}">
-                    <a16:rowId xmlns:a16="http://schemas.microsoft.com/office/drawing/2014/main" val="351087440"/>
+                    <a16:rowId xmlns:a16="http://schemas.microsoft.com/office/drawing/2014/main" val="40605924"/>
                   </a:ext>
                 </a:extLst>
               </a:tr>
-              <a:tr h="260510">
+              <a:tr h="185064">
                 <a:tc>
                   <a:txBody>
                     <a:bodyPr/>
                     <a:lstStyle/>
                     <a:p>
-                      <a:pPr marL="0" marR="0" lvl="0" indent="0" algn="l" defTabSz="914400" rtl="0" eaLnBrk="1" fontAlgn="auto" latinLnBrk="0" hangingPunct="1">
-                        <a:lnSpc>
-                          <a:spcPct val="100000"/>
-                        </a:lnSpc>
+                      <a:pPr marL="0" marR="0" indent="0" algn="l" rtl="0" eaLnBrk="1" fontAlgn="auto" latinLnBrk="0" hangingPunct="1">
                         <a:spcBef>
                           <a:spcPts val="0"/>
                         </a:spcBef>
                         <a:spcAft>
                           <a:spcPts val="0"/>
                         </a:spcAft>
-                        <a:buClrTx/>
-                        <a:buSzTx/>
-                        <a:buFontTx/>
-                        <a:buNone/>
-                        <a:tabLst/>
-                        <a:defRPr/>
                       </a:pPr>
                       <a:r>
-                        <a:rPr lang="en-US" sz="1100" dirty="0"/>
+                        <a:rPr lang="en-US" sz="1100" kern="1200" dirty="0">
+                          <a:effectLst/>
+                        </a:rPr>
                         <a:t>Artesunate + Mefloquine (AS+MQ)</a:t>
                       </a:r>
+                      <a:endParaRPr lang="en-US" sz="1700" dirty="0">
+                        <a:effectLst/>
+                      </a:endParaRPr>
                     </a:p>
                   </a:txBody>
-                  <a:tcPr/>
+                  <a:tcPr marL="0" marR="0" marT="0" marB="0" anchor="ctr"/>
                 </a:tc>
                 <a:tc>
                   <a:txBody>
                     <a:bodyPr/>
                     <a:lstStyle/>
                     <a:p>
-                      <a:pPr algn="ctr"/>
-                      <a:r>
-                        <a:rPr lang="en-US" sz="1100" b="1" dirty="0">
-                          <a:solidFill>
-                            <a:srgbClr val="002060"/>
-                          </a:solidFill>
+                      <a:pPr marL="0" algn="ctr" rtl="0" eaLnBrk="1" latinLnBrk="0" hangingPunct="1">
+                        <a:spcBef>
+                          <a:spcPts val="0"/>
+                        </a:spcBef>
+                        <a:spcAft>
+                          <a:spcPts val="0"/>
+                        </a:spcAft>
+                      </a:pPr>
+                      <a:r>
+                        <a:rPr lang="en-US" sz="1100" kern="1200" dirty="0">
+                          <a:effectLst/>
                         </a:rPr>
                         <a:t>H</a:t>
                       </a:r>
+                      <a:endParaRPr lang="en-US" sz="1700" dirty="0">
+                        <a:effectLst/>
+                      </a:endParaRPr>
                     </a:p>
                   </a:txBody>
-                  <a:tcPr/>
+                  <a:tcPr marL="0" marR="0" marT="0" marB="0" anchor="ctr"/>
                 </a:tc>
                 <a:extLst>
                   <a:ext uri="{0D108BD9-81ED-4DB2-BD59-A6C34878D82A}">
-                    <a16:rowId xmlns:a16="http://schemas.microsoft.com/office/drawing/2014/main" val="1866373577"/>
+                    <a16:rowId xmlns:a16="http://schemas.microsoft.com/office/drawing/2014/main" val="1250478979"/>
                   </a:ext>
                 </a:extLst>
               </a:tr>
-              <a:tr h="260510">
+              <a:tr h="255264">
                 <a:tc>
                   <a:txBody>
                     <a:bodyPr/>
                     <a:lstStyle/>
                     <a:p>
-                      <a:pPr marL="0" marR="0" lvl="0" indent="0" algn="l" defTabSz="914400" rtl="0" eaLnBrk="1" fontAlgn="auto" latinLnBrk="0" hangingPunct="1">
-                        <a:lnSpc>
-                          <a:spcPct val="100000"/>
-                        </a:lnSpc>
+                      <a:pPr marL="0" marR="0" indent="0" algn="l" rtl="0" eaLnBrk="1" fontAlgn="auto" latinLnBrk="0" hangingPunct="1">
                         <a:spcBef>
                           <a:spcPts val="0"/>
                         </a:spcBef>
                         <a:spcAft>
                           <a:spcPts val="0"/>
                         </a:spcAft>
-                        <a:buClrTx/>
-                        <a:buSzTx/>
-                        <a:buFontTx/>
-                        <a:buNone/>
-                        <a:tabLst/>
-                        <a:defRPr/>
                       </a:pPr>
                       <a:r>
-                        <a:rPr lang="en-US" sz="1100" dirty="0"/>
-                        <a:t>Dihydroartemisinin + Piperaquine (DHA+PQ)</a:t>
-                      </a:r>
+                        <a:rPr lang="en-US" sz="1100" kern="1200" dirty="0" err="1">
+                          <a:effectLst/>
+                        </a:rPr>
+                        <a:t>Dihydroartemisinin</a:t>
+                      </a:r>
+                      <a:r>
+                        <a:rPr lang="en-US" sz="1100" kern="1200" dirty="0">
+                          <a:effectLst/>
+                        </a:rPr>
+                        <a:t> + Piperaquine (DHA+PQ)</a:t>
+                      </a:r>
+                      <a:endParaRPr lang="en-US" sz="1700" dirty="0">
+                        <a:effectLst/>
+                      </a:endParaRPr>
                     </a:p>
                   </a:txBody>
-                  <a:tcPr/>
+                  <a:tcPr marL="0" marR="0" marT="0" marB="0" anchor="ctr"/>
                 </a:tc>
                 <a:tc>
                   <a:txBody>
                     <a:bodyPr/>
                     <a:lstStyle/>
                     <a:p>
-                      <a:pPr algn="ctr"/>
-                      <a:r>
-                        <a:rPr lang="en-US" sz="1100" b="1" dirty="0">
-                          <a:solidFill>
-                            <a:srgbClr val="002060"/>
-                          </a:solidFill>
+                      <a:pPr marL="0" algn="ctr" rtl="0" eaLnBrk="1" latinLnBrk="0" hangingPunct="1">
+                        <a:spcBef>
+                          <a:spcPts val="0"/>
+                        </a:spcBef>
+                        <a:spcAft>
+                          <a:spcPts val="0"/>
+                        </a:spcAft>
+                      </a:pPr>
+                      <a:r>
+                        <a:rPr lang="en-US" sz="1100" kern="1200" dirty="0">
+                          <a:effectLst/>
                         </a:rPr>
                         <a:t>I</a:t>
                       </a:r>
+                      <a:endParaRPr lang="en-US" sz="1700" dirty="0">
+                        <a:effectLst/>
+                      </a:endParaRPr>
                     </a:p>
                   </a:txBody>
-                  <a:tcPr/>
+                  <a:tcPr marL="0" marR="0" marT="0" marB="0" anchor="ctr"/>
                 </a:tc>
                 <a:extLst>
                   <a:ext uri="{0D108BD9-81ED-4DB2-BD59-A6C34878D82A}">
-                    <a16:rowId xmlns:a16="http://schemas.microsoft.com/office/drawing/2014/main" val="280076549"/>
+                    <a16:rowId xmlns:a16="http://schemas.microsoft.com/office/drawing/2014/main" val="3393946374"/>
                   </a:ext>
                 </a:extLst>
               </a:tr>
-              <a:tr h="260510">
+              <a:tr h="255264">
                 <a:tc>
                   <a:txBody>
                     <a:bodyPr/>
                     <a:lstStyle/>
                     <a:p>
-                      <a:pPr marL="0" marR="0" lvl="0" indent="0" algn="l" defTabSz="914400" rtl="0" eaLnBrk="1" fontAlgn="auto" latinLnBrk="0" hangingPunct="1">
-                        <a:lnSpc>
-                          <a:spcPct val="100000"/>
-                        </a:lnSpc>
+                      <a:pPr marL="0" marR="0" indent="0" algn="l" rtl="0" eaLnBrk="1" fontAlgn="auto" latinLnBrk="0" hangingPunct="1">
                         <a:spcBef>
                           <a:spcPts val="0"/>
                         </a:spcBef>
                         <a:spcAft>
                           <a:spcPts val="0"/>
                         </a:spcAft>
-                        <a:buClrTx/>
-                        <a:buSzTx/>
-                        <a:buFontTx/>
-                        <a:buNone/>
-                        <a:tabLst/>
-                        <a:defRPr/>
                       </a:pPr>
                       <a:r>
-                        <a:rPr lang="en-US" sz="1100" dirty="0"/>
-                        <a:t>Artesunate + Sulphadoxine + Pyrimethamine (AS+SP+PQ)</a:t>
-                      </a:r>
+                        <a:rPr lang="en-US" sz="1100" kern="1200" dirty="0" err="1">
+                          <a:effectLst/>
+                        </a:rPr>
+                        <a:t>Arthemether</a:t>
+                      </a:r>
+                      <a:r>
+                        <a:rPr lang="en-US" sz="1100" kern="1200" dirty="0">
+                          <a:effectLst/>
+                        </a:rPr>
+                        <a:t> + Mefloquine + Piperaquine (AL+MQ+PQ) </a:t>
+                      </a:r>
+                      <a:endParaRPr lang="en-US" sz="1700" dirty="0">
+                        <a:effectLst/>
+                      </a:endParaRPr>
                     </a:p>
                   </a:txBody>
-                  <a:tcPr/>
+                  <a:tcPr marL="0" marR="0" marT="0" marB="0" anchor="ctr"/>
                 </a:tc>
                 <a:tc>
                   <a:txBody>
                     <a:bodyPr/>
                     <a:lstStyle/>
                     <a:p>
-                      <a:pPr algn="ctr"/>
-                      <a:r>
-                        <a:rPr lang="en-US" sz="1100" b="1" dirty="0">
-                          <a:solidFill>
-                            <a:srgbClr val="002060"/>
-                          </a:solidFill>
+                      <a:pPr marL="0" algn="ctr" rtl="0" eaLnBrk="1" latinLnBrk="0" hangingPunct="1">
+                        <a:spcBef>
+                          <a:spcPts val="0"/>
+                        </a:spcBef>
+                        <a:spcAft>
+                          <a:spcPts val="0"/>
+                        </a:spcAft>
+                      </a:pPr>
+                      <a:r>
+                        <a:rPr lang="en-US" sz="1100" kern="1200" dirty="0">
+                          <a:effectLst/>
                         </a:rPr>
-                        <a:t>J</a:t>
-                      </a:r>
+                        <a:t>K</a:t>
+                      </a:r>
+                      <a:endParaRPr lang="en-US" sz="1700" dirty="0">
+                        <a:effectLst/>
+                      </a:endParaRPr>
                     </a:p>
                   </a:txBody>
-                  <a:tcPr/>
+                  <a:tcPr marL="0" marR="0" marT="0" marB="0" anchor="ctr"/>
                 </a:tc>
                 <a:extLst>
                   <a:ext uri="{0D108BD9-81ED-4DB2-BD59-A6C34878D82A}">
-                    <a16:rowId xmlns:a16="http://schemas.microsoft.com/office/drawing/2014/main" val="4247894115"/>
+                    <a16:rowId xmlns:a16="http://schemas.microsoft.com/office/drawing/2014/main" val="3701268697"/>
                   </a:ext>
                 </a:extLst>
               </a:tr>
-              <a:tr h="260510">
+              <a:tr h="255264">
                 <a:tc>
                   <a:txBody>
                     <a:bodyPr/>
                     <a:lstStyle/>
                     <a:p>
-                      <a:pPr marL="0" marR="0" lvl="0" indent="0" algn="l" rtl="0" eaLnBrk="1" fontAlgn="auto" latinLnBrk="0" hangingPunct="1">
-                        <a:lnSpc>
-                          <a:spcPct val="100000"/>
-                        </a:lnSpc>
+                      <a:pPr marL="0" marR="0" indent="0" algn="l" rtl="0" eaLnBrk="1" fontAlgn="auto" latinLnBrk="0" hangingPunct="1">
                         <a:spcBef>
                           <a:spcPts val="0"/>
                         </a:spcBef>
                         <a:spcAft>
                           <a:spcPts val="0"/>
                         </a:spcAft>
-                        <a:buClrTx/>
-                        <a:buSzTx/>
-                        <a:buFontTx/>
-                        <a:buNone/>
                       </a:pPr>
                       <a:r>
-                        <a:rPr lang="en-US" sz="1100" dirty="0"/>
-                        <a:t>Arthemether + Mefloquine + Piperaquine (AL+MQ+PQ) </a:t>
-                      </a:r>
+                        <a:rPr lang="en-US" sz="1100" kern="1200" dirty="0">
+                          <a:effectLst/>
+                        </a:rPr>
+                        <a:t>Doxycycline</a:t>
+                      </a:r>
+                      <a:endParaRPr lang="en-US" sz="1700" dirty="0">
+                        <a:effectLst/>
+                      </a:endParaRPr>
                     </a:p>
                   </a:txBody>
-                  <a:tcPr/>
+                  <a:tcPr marL="0" marR="0" marT="0" marB="0" anchor="ctr"/>
                 </a:tc>
                 <a:tc>
                   <a:txBody>
                     <a:bodyPr/>
                     <a:lstStyle/>
                     <a:p>
-                      <a:pPr algn="ctr"/>
-                      <a:r>
-                        <a:rPr lang="en-US" sz="1100" b="1" dirty="0">
-                          <a:solidFill>
-                            <a:srgbClr val="002060"/>
-                          </a:solidFill>
+                      <a:pPr marL="0" algn="ctr" rtl="0" eaLnBrk="1" latinLnBrk="0" hangingPunct="1">
+                        <a:spcBef>
+                          <a:spcPts val="0"/>
+                        </a:spcBef>
+                        <a:spcAft>
+                          <a:spcPts val="0"/>
+                        </a:spcAft>
+                      </a:pPr>
+                      <a:r>
+                        <a:rPr lang="en-US" sz="1100" kern="1200" dirty="0">
+                          <a:effectLst/>
                         </a:rPr>
-                        <a:t>K</a:t>
-                      </a:r>
+                        <a:t>L</a:t>
+                      </a:r>
+                      <a:endParaRPr lang="en-US" sz="1700" dirty="0">
+                        <a:effectLst/>
+                      </a:endParaRPr>
                     </a:p>
                   </a:txBody>
-                  <a:tcPr/>
+                  <a:tcPr marL="0" marR="0" marT="0" marB="0" anchor="ctr"/>
                 </a:tc>
                 <a:extLst>
                   <a:ext uri="{0D108BD9-81ED-4DB2-BD59-A6C34878D82A}">
-                    <a16:rowId xmlns:a16="http://schemas.microsoft.com/office/drawing/2014/main" val="623772020"/>
+                    <a16:rowId xmlns:a16="http://schemas.microsoft.com/office/drawing/2014/main" val="3951952638"/>
                   </a:ext>
                 </a:extLst>
               </a:tr>
-              <a:tr h="260510">
+              <a:tr h="255264">
                 <a:tc>
                   <a:txBody>
                     <a:bodyPr/>
                     <a:lstStyle/>
                     <a:p>
-                      <a:pPr marL="0" marR="0" lvl="0" indent="0" algn="l" defTabSz="914400" rtl="0" eaLnBrk="1" fontAlgn="auto" latinLnBrk="0" hangingPunct="1">
-                        <a:lnSpc>
-                          <a:spcPct val="100000"/>
-                        </a:lnSpc>
+                      <a:pPr marL="0" marR="0" indent="0" algn="l" rtl="0" eaLnBrk="1" fontAlgn="auto" latinLnBrk="0" hangingPunct="1">
                         <a:spcBef>
                           <a:spcPts val="0"/>
                         </a:spcBef>
                         <a:spcAft>
                           <a:spcPts val="0"/>
                         </a:spcAft>
-                        <a:buClrTx/>
-                        <a:buSzTx/>
-                        <a:buFontTx/>
-                        <a:buNone/>
-                        <a:tabLst/>
-                        <a:defRPr/>
                       </a:pPr>
                       <a:r>
-                        <a:rPr lang="en-US" sz="1100" dirty="0"/>
-                        <a:t>Doxycycline</a:t>
-                      </a:r>
+                        <a:rPr lang="en-US" sz="1100" kern="1200" dirty="0">
+                          <a:effectLst/>
+                        </a:rPr>
+                        <a:t>Atovaquone/Proguanil (</a:t>
+                      </a:r>
+                      <a:r>
+                        <a:rPr lang="en-US" sz="1100" kern="1200" dirty="0" err="1">
+                          <a:effectLst/>
+                        </a:rPr>
+                        <a:t>Malarone</a:t>
+                      </a:r>
+                      <a:r>
+                        <a:rPr lang="en-US" sz="1100" kern="1200" dirty="0">
+                          <a:effectLst/>
+                        </a:rPr>
+                        <a:t>)</a:t>
+                      </a:r>
+                      <a:endParaRPr lang="en-US" sz="1700" dirty="0">
+                        <a:effectLst/>
+                      </a:endParaRPr>
                     </a:p>
                   </a:txBody>
-                  <a:tcPr/>
+                  <a:tcPr marL="0" marR="0" marT="0" marB="0" anchor="ctr"/>
                 </a:tc>
                 <a:tc>
                   <a:txBody>
                     <a:bodyPr/>
                     <a:lstStyle/>
                     <a:p>
-                      <a:pPr algn="ctr"/>
-                      <a:r>
-                        <a:rPr lang="en-US" sz="1100" b="1" dirty="0">
-                          <a:solidFill>
-                            <a:srgbClr val="002060"/>
-                          </a:solidFill>
+                      <a:pPr marL="0" algn="ctr" rtl="0" eaLnBrk="1" latinLnBrk="0" hangingPunct="1">
+                        <a:spcBef>
+                          <a:spcPts val="0"/>
+                        </a:spcBef>
+                        <a:spcAft>
+                          <a:spcPts val="0"/>
+                        </a:spcAft>
+                      </a:pPr>
+                      <a:r>
+                        <a:rPr lang="en-US" sz="1100" kern="1200" dirty="0">
+                          <a:effectLst/>
                         </a:rPr>
-                        <a:t>L</a:t>
-                      </a:r>
+                        <a:t>M</a:t>
+                      </a:r>
+                      <a:endParaRPr lang="en-US" sz="1700" dirty="0">
+                        <a:effectLst/>
+                      </a:endParaRPr>
                     </a:p>
                   </a:txBody>
-                  <a:tcPr/>
+                  <a:tcPr marL="0" marR="0" marT="0" marB="0" anchor="ctr"/>
                 </a:tc>
                 <a:extLst>
                   <a:ext uri="{0D108BD9-81ED-4DB2-BD59-A6C34878D82A}">
-                    <a16:rowId xmlns:a16="http://schemas.microsoft.com/office/drawing/2014/main" val="921300829"/>
+                    <a16:rowId xmlns:a16="http://schemas.microsoft.com/office/drawing/2014/main" val="2219462951"/>
                   </a:ext>
                 </a:extLst>
               </a:tr>
-              <a:tr h="260510">
+              <a:tr h="255264">
                 <a:tc>
                   <a:txBody>
                     <a:bodyPr/>
                     <a:lstStyle/>
                     <a:p>
-                      <a:pPr marL="0" marR="0" lvl="0" indent="0" algn="l" defTabSz="914400" rtl="0" eaLnBrk="1" fontAlgn="auto" latinLnBrk="0" hangingPunct="1">
-                        <a:lnSpc>
-                          <a:spcPct val="100000"/>
-                        </a:lnSpc>
+                      <a:pPr marL="0" marR="0" indent="0" algn="l" rtl="0" eaLnBrk="1" fontAlgn="auto" latinLnBrk="0" hangingPunct="1">
                         <a:spcBef>
                           <a:spcPts val="0"/>
                         </a:spcBef>
                         <a:spcAft>
                           <a:spcPts val="0"/>
                         </a:spcAft>
-                        <a:buClrTx/>
-                        <a:buSzTx/>
-                        <a:buFontTx/>
-                        <a:buNone/>
-                        <a:tabLst/>
-                        <a:defRPr/>
                       </a:pPr>
                       <a:r>
-                        <a:rPr lang="en-US" sz="1100" dirty="0"/>
-                        <a:t>Atovaquone/Proguanil (Malarone)</a:t>
-                      </a:r>
+                        <a:rPr lang="en-US" sz="1100" kern="1200" dirty="0">
+                          <a:effectLst/>
+                        </a:rPr>
+                        <a:t>Quinine</a:t>
+                      </a:r>
+                      <a:endParaRPr lang="en-US" sz="1700" dirty="0">
+                        <a:effectLst/>
+                      </a:endParaRPr>
                     </a:p>
                   </a:txBody>
-                  <a:tcPr/>
+                  <a:tcPr marL="0" marR="0" marT="0" marB="0" anchor="ctr"/>
                 </a:tc>
                 <a:tc>
                   <a:txBody>
                     <a:bodyPr/>
                     <a:lstStyle/>
                     <a:p>
-                      <a:pPr algn="ctr"/>
-                      <a:r>
-                        <a:rPr lang="en-US" sz="1100" b="1" dirty="0">
-                          <a:solidFill>
-                            <a:srgbClr val="002060"/>
-                          </a:solidFill>
+                      <a:pPr marL="0" algn="ctr" rtl="0" eaLnBrk="1" latinLnBrk="0" hangingPunct="1">
+                        <a:spcBef>
+                          <a:spcPts val="0"/>
+                        </a:spcBef>
+                        <a:spcAft>
+                          <a:spcPts val="0"/>
+                        </a:spcAft>
+                      </a:pPr>
+                      <a:r>
+                        <a:rPr lang="en-US" sz="1100" kern="1200" dirty="0">
+                          <a:effectLst/>
                         </a:rPr>
-                        <a:t>M</a:t>
-                      </a:r>
+                        <a:t>N</a:t>
+                      </a:r>
+                      <a:endParaRPr lang="en-US" sz="1700" dirty="0">
+                        <a:effectLst/>
+                      </a:endParaRPr>
                     </a:p>
                   </a:txBody>
-                  <a:tcPr/>
+                  <a:tcPr marL="0" marR="0" marT="0" marB="0" anchor="ctr"/>
                 </a:tc>
                 <a:extLst>
                   <a:ext uri="{0D108BD9-81ED-4DB2-BD59-A6C34878D82A}">
-                    <a16:rowId xmlns:a16="http://schemas.microsoft.com/office/drawing/2014/main" val="3127484224"/>
+                    <a16:rowId xmlns:a16="http://schemas.microsoft.com/office/drawing/2014/main" val="3584836826"/>
                   </a:ext>
                 </a:extLst>
               </a:tr>
-              <a:tr h="260510">
+              <a:tr h="255264">
                 <a:tc>
                   <a:txBody>
                     <a:bodyPr/>
                     <a:lstStyle/>
                     <a:p>
-                      <a:pPr marL="0" marR="0" lvl="0" indent="0" algn="l" defTabSz="914400" rtl="0" eaLnBrk="1" fontAlgn="auto" latinLnBrk="0" hangingPunct="1">
-                        <a:lnSpc>
-                          <a:spcPct val="100000"/>
-                        </a:lnSpc>
+                      <a:pPr marL="0" marR="0" indent="0" algn="l" rtl="0" eaLnBrk="1" fontAlgn="auto" latinLnBrk="0" hangingPunct="1">
                         <a:spcBef>
                           <a:spcPts val="0"/>
                         </a:spcBef>
                         <a:spcAft>
                           <a:spcPts val="0"/>
                         </a:spcAft>
-                        <a:buClrTx/>
-                        <a:buSzTx/>
-                        <a:buFontTx/>
-                        <a:buNone/>
-                        <a:tabLst/>
-                        <a:defRPr/>
                       </a:pPr>
                       <a:r>
-                        <a:rPr lang="en-US" sz="1100" dirty="0"/>
-                        <a:t>Quinine</a:t>
-                      </a:r>
+                        <a:rPr lang="en-US" sz="1100" kern="1200" dirty="0">
+                          <a:effectLst/>
+                        </a:rPr>
+                        <a:t>Doxycycline + Quinine</a:t>
+                      </a:r>
+                      <a:r>
+                        <a:rPr lang="en-US" sz="1100" kern="1200" baseline="0" dirty="0">
+                          <a:effectLst/>
+                        </a:rPr>
+                        <a:t> </a:t>
+                      </a:r>
+                      <a:r>
+                        <a:rPr lang="en-US" sz="1100" kern="1200" dirty="0">
+                          <a:effectLst/>
+                        </a:rPr>
+                        <a:t>(L + N)</a:t>
+                      </a:r>
+                      <a:endParaRPr lang="en-US" sz="1700" dirty="0">
+                        <a:effectLst/>
+                      </a:endParaRPr>
                     </a:p>
                   </a:txBody>
-                  <a:tcPr/>
+                  <a:tcPr marL="0" marR="0" marT="0" marB="0" anchor="ctr"/>
                 </a:tc>
                 <a:tc>
                   <a:txBody>
                     <a:bodyPr/>
                     <a:lstStyle/>
                     <a:p>
-                      <a:pPr algn="ctr"/>
-                      <a:r>
-                        <a:rPr lang="en-US" sz="1100" b="1" dirty="0">
-                          <a:solidFill>
-                            <a:srgbClr val="002060"/>
-                          </a:solidFill>
+                      <a:pPr marL="0" algn="ctr" rtl="0" eaLnBrk="1" latinLnBrk="0" hangingPunct="1">
+                        <a:spcBef>
+                          <a:spcPts val="0"/>
+                        </a:spcBef>
+                        <a:spcAft>
+                          <a:spcPts val="0"/>
+                        </a:spcAft>
+                      </a:pPr>
+                      <a:r>
+                        <a:rPr lang="en-US" sz="1100" kern="1200" dirty="0">
+                          <a:effectLst/>
                         </a:rPr>
-                        <a:t>N</a:t>
-                      </a:r>
+                        <a:t>O</a:t>
+                      </a:r>
+                      <a:endParaRPr lang="en-US" sz="1700" dirty="0">
+                        <a:effectLst/>
+                      </a:endParaRPr>
                     </a:p>
                   </a:txBody>
-                  <a:tcPr/>
+                  <a:tcPr marL="0" marR="0" marT="0" marB="0" anchor="ctr"/>
                 </a:tc>
                 <a:extLst>
                   <a:ext uri="{0D108BD9-81ED-4DB2-BD59-A6C34878D82A}">
-                    <a16:rowId xmlns:a16="http://schemas.microsoft.com/office/drawing/2014/main" val="256506659"/>
+                    <a16:rowId xmlns:a16="http://schemas.microsoft.com/office/drawing/2014/main" val="2891482591"/>
                   </a:ext>
                 </a:extLst>
               </a:tr>
-              <a:tr h="260510">
+              <a:tr h="255264">
                 <a:tc>
                   <a:txBody>
                     <a:bodyPr/>
                     <a:lstStyle/>
                     <a:p>
-                      <a:pPr marL="0" marR="0" lvl="0" indent="0" algn="l" defTabSz="914400" rtl="0" eaLnBrk="1" fontAlgn="auto" latinLnBrk="0" hangingPunct="1">
-                        <a:lnSpc>
-                          <a:spcPct val="100000"/>
-                        </a:lnSpc>
+                      <a:pPr marL="0" marR="0" indent="0" algn="l" rtl="0" eaLnBrk="1" fontAlgn="auto" latinLnBrk="0" hangingPunct="1">
                         <a:spcBef>
                           <a:spcPts val="0"/>
                         </a:spcBef>
                         <a:spcAft>
                           <a:spcPts val="0"/>
                         </a:spcAft>
-                        <a:buClrTx/>
-                        <a:buSzTx/>
-                        <a:buFontTx/>
-                        <a:buNone/>
-                        <a:tabLst/>
-                        <a:defRPr/>
                       </a:pPr>
                       <a:r>
-                        <a:rPr lang="en-US" sz="1100" dirty="0"/>
-                        <a:t>Quinine</a:t>
-                      </a:r>
-                      <a:r>
-                        <a:rPr lang="en-US" sz="1100" baseline="0" dirty="0"/>
-                        <a:t> + </a:t>
-                      </a:r>
-                      <a:r>
-                        <a:rPr lang="en-US" sz="1100" dirty="0"/>
-                        <a:t>Doxycycline</a:t>
-                      </a:r>
+                        <a:rPr lang="en-US" sz="1100" kern="1200" dirty="0" err="1">
+                          <a:effectLst/>
+                        </a:rPr>
+                        <a:t>Arthemether-Lumafantrine</a:t>
+                      </a:r>
+                      <a:r>
+                        <a:rPr lang="en-US" sz="1100" kern="1200" dirty="0">
+                          <a:effectLst/>
+                        </a:rPr>
+                        <a:t> + Atovaquone/Proguanil </a:t>
+                      </a:r>
+                      <a:r>
+                        <a:rPr lang="en-US" sz="1100" kern="1200" baseline="0" dirty="0">
+                          <a:effectLst/>
+                        </a:rPr>
+                        <a:t> </a:t>
+                      </a:r>
+                      <a:r>
+                        <a:rPr lang="en-US" sz="1100" kern="1200" dirty="0">
+                          <a:effectLst/>
+                        </a:rPr>
+                        <a:t>(AL + M)</a:t>
+                      </a:r>
+                      <a:endParaRPr lang="en-US" sz="1700" dirty="0">
+                        <a:effectLst/>
+                      </a:endParaRPr>
                     </a:p>
                   </a:txBody>
-                  <a:tcPr/>
+                  <a:tcPr marL="0" marR="0" marT="0" marB="0" anchor="ctr"/>
                 </a:tc>
                 <a:tc>
                   <a:txBody>
                     <a:bodyPr/>
                     <a:lstStyle/>
                     <a:p>
-                      <a:pPr algn="ctr"/>
-                      <a:r>
-                        <a:rPr lang="en-US" sz="1100" b="1" dirty="0">
-                          <a:solidFill>
-                            <a:srgbClr val="002060"/>
-                          </a:solidFill>
+                      <a:pPr marL="0" algn="ctr" rtl="0" eaLnBrk="1" latinLnBrk="0" hangingPunct="1">
+                        <a:spcBef>
+                          <a:spcPts val="0"/>
+                        </a:spcBef>
+                        <a:spcAft>
+                          <a:spcPts val="0"/>
+                        </a:spcAft>
+                      </a:pPr>
+                      <a:r>
+                        <a:rPr lang="en-US" sz="1100" kern="1200" dirty="0">
+                          <a:effectLst/>
                         </a:rPr>
-                        <a:t>O</a:t>
-                      </a:r>
+                        <a:t>P</a:t>
+                      </a:r>
+                      <a:endParaRPr lang="en-US" sz="1700" dirty="0">
+                        <a:effectLst/>
+                      </a:endParaRPr>
                     </a:p>
                   </a:txBody>
-                  <a:tcPr/>
+                  <a:tcPr marL="0" marR="0" marT="0" marB="0" anchor="ctr"/>
                 </a:tc>
                 <a:extLst>
                   <a:ext uri="{0D108BD9-81ED-4DB2-BD59-A6C34878D82A}">
-                    <a16:rowId xmlns:a16="http://schemas.microsoft.com/office/drawing/2014/main" val="1142068229"/>
+                    <a16:rowId xmlns:a16="http://schemas.microsoft.com/office/drawing/2014/main" val="3931489087"/>
                   </a:ext>
                 </a:extLst>
               </a:tr>
-              <a:tr h="260510">
+              <a:tr h="255264">
                 <a:tc>
                   <a:txBody>
                     <a:bodyPr/>
                     <a:lstStyle/>
                     <a:p>
-                      <a:pPr marL="0" marR="0" lvl="0" indent="0" algn="l" defTabSz="914400" rtl="0" eaLnBrk="1" fontAlgn="auto" latinLnBrk="0" hangingPunct="1">
-                        <a:lnSpc>
-                          <a:spcPct val="100000"/>
-                        </a:lnSpc>
+                      <a:pPr marL="0" marR="0" indent="0" algn="l" rtl="0" eaLnBrk="1" fontAlgn="auto" latinLnBrk="0" hangingPunct="1">
                         <a:spcBef>
                           <a:spcPts val="0"/>
                         </a:spcBef>
                         <a:spcAft>
                           <a:spcPts val="0"/>
                         </a:spcAft>
-                        <a:buClrTx/>
-                        <a:buSzTx/>
-                        <a:buFontTx/>
-                        <a:buNone/>
-                        <a:tabLst/>
-                        <a:defRPr/>
                       </a:pPr>
                       <a:r>
-                        <a:rPr lang="en-US" sz="1100" dirty="0"/>
-                        <a:t>Atovaquone/Proguanil +</a:t>
-                      </a:r>
-                      <a:r>
-                        <a:rPr lang="en-US" sz="1100" baseline="0" dirty="0"/>
-                        <a:t> </a:t>
-                      </a:r>
-                      <a:r>
-                        <a:rPr lang="en-US" sz="1100" dirty="0"/>
-                        <a:t>Arthemether-Lumafantrine</a:t>
-                      </a:r>
+                        <a:rPr lang="en-US" sz="1100" kern="1200" dirty="0">
+                          <a:effectLst/>
+                        </a:rPr>
+                        <a:t>Mefloquine</a:t>
+                      </a:r>
+                      <a:endParaRPr lang="en-US" sz="1700" dirty="0">
+                        <a:effectLst/>
+                      </a:endParaRPr>
                     </a:p>
                   </a:txBody>
-                  <a:tcPr/>
+                  <a:tcPr marL="0" marR="0" marT="0" marB="0" anchor="ctr"/>
                 </a:tc>
                 <a:tc>
                   <a:txBody>
                     <a:bodyPr/>
                     <a:lstStyle/>
                     <a:p>
-                      <a:pPr algn="ctr"/>
-                      <a:r>
-                        <a:rPr lang="en-US" sz="1100" b="1" dirty="0">
-                          <a:solidFill>
-                            <a:srgbClr val="002060"/>
-                          </a:solidFill>
+                      <a:pPr marL="0" algn="ctr" rtl="0" eaLnBrk="1" latinLnBrk="0" hangingPunct="1">
+                        <a:spcBef>
+                          <a:spcPts val="0"/>
+                        </a:spcBef>
+                        <a:spcAft>
+                          <a:spcPts val="0"/>
+                        </a:spcAft>
+                      </a:pPr>
+                      <a:r>
+                        <a:rPr lang="en-US" sz="1100" kern="1200" dirty="0">
+                          <a:effectLst/>
                         </a:rPr>
-                        <a:t>P</a:t>
-                      </a:r>
+                        <a:t>Q</a:t>
+                      </a:r>
+                      <a:endParaRPr lang="en-US" sz="1700" dirty="0">
+                        <a:effectLst/>
+                      </a:endParaRPr>
                     </a:p>
                   </a:txBody>
-                  <a:tcPr/>
+                  <a:tcPr marL="0" marR="0" marT="0" marB="0" anchor="ctr"/>
                 </a:tc>
                 <a:extLst>
                   <a:ext uri="{0D108BD9-81ED-4DB2-BD59-A6C34878D82A}">
-                    <a16:rowId xmlns:a16="http://schemas.microsoft.com/office/drawing/2014/main" val="1571486250"/>
+                    <a16:rowId xmlns:a16="http://schemas.microsoft.com/office/drawing/2014/main" val="1564309824"/>
                   </a:ext>
                 </a:extLst>
               </a:tr>
-              <a:tr h="260510">
+              <a:tr h="255264">
                 <a:tc>
                   <a:txBody>
                     <a:bodyPr/>
                     <a:lstStyle/>
                     <a:p>
-                      <a:pPr marL="0" marR="0" lvl="0" indent="0" algn="l" defTabSz="914400" rtl="0" eaLnBrk="1" fontAlgn="auto" latinLnBrk="0" hangingPunct="1">
-                        <a:lnSpc>
-                          <a:spcPct val="100000"/>
-                        </a:lnSpc>
+                      <a:pPr marL="0" marR="0" indent="0" algn="l" rtl="0" eaLnBrk="1" fontAlgn="auto" latinLnBrk="0" hangingPunct="1">
                         <a:spcBef>
                           <a:spcPts val="0"/>
                         </a:spcBef>
                         <a:spcAft>
                           <a:spcPts val="0"/>
                         </a:spcAft>
-                        <a:buClrTx/>
-                        <a:buSzTx/>
-                        <a:buFontTx/>
-                        <a:buNone/>
-                        <a:tabLst/>
-                        <a:defRPr/>
                       </a:pPr>
                       <a:r>
-                        <a:rPr lang="en-US" sz="1100" dirty="0"/>
-                        <a:t>Mefloquine</a:t>
-                      </a:r>
+                        <a:rPr lang="en-US" sz="1100" kern="1200" dirty="0" err="1">
+                          <a:effectLst/>
+                        </a:rPr>
+                        <a:t>Vanomycin</a:t>
+                      </a:r>
+                      <a:r>
+                        <a:rPr lang="en-US" sz="1100" kern="1200" dirty="0">
+                          <a:effectLst/>
+                        </a:rPr>
+                        <a:t> and Rocephin</a:t>
+                      </a:r>
+                      <a:endParaRPr lang="en-US" sz="1700" dirty="0">
+                        <a:effectLst/>
+                      </a:endParaRPr>
                     </a:p>
                   </a:txBody>
-                  <a:tcPr/>
+                  <a:tcPr marL="0" marR="0" marT="0" marB="0" anchor="ctr"/>
                 </a:tc>
                 <a:tc>
                   <a:txBody>
                     <a:bodyPr/>
                     <a:lstStyle/>
                     <a:p>
-                      <a:pPr algn="ctr"/>
-                      <a:r>
-                        <a:rPr lang="en-US" sz="1100" b="1" dirty="0">
-                          <a:solidFill>
-                            <a:srgbClr val="002060"/>
-                          </a:solidFill>
+                      <a:pPr marL="0" algn="ctr" rtl="0" eaLnBrk="1" latinLnBrk="0" hangingPunct="1">
+                        <a:spcBef>
+                          <a:spcPts val="0"/>
+                        </a:spcBef>
+                        <a:spcAft>
+                          <a:spcPts val="0"/>
+                        </a:spcAft>
+                      </a:pPr>
+                      <a:r>
+                        <a:rPr lang="en-US" sz="1100" kern="1200" dirty="0">
+                          <a:effectLst/>
                         </a:rPr>
-                        <a:t>Q</a:t>
-                      </a:r>
+                        <a:t>R</a:t>
+                      </a:r>
+                      <a:endParaRPr lang="en-US" sz="1700" dirty="0">
+                        <a:effectLst/>
+                      </a:endParaRPr>
                     </a:p>
                   </a:txBody>
-                  <a:tcPr/>
+                  <a:tcPr marL="0" marR="0" marT="0" marB="0" anchor="ctr"/>
                 </a:tc>
                 <a:extLst>
                   <a:ext uri="{0D108BD9-81ED-4DB2-BD59-A6C34878D82A}">
-                    <a16:rowId xmlns:a16="http://schemas.microsoft.com/office/drawing/2014/main" val="2079882734"/>
+                    <a16:rowId xmlns:a16="http://schemas.microsoft.com/office/drawing/2014/main" val="470388011"/>
                   </a:ext>
                 </a:extLst>
               </a:tr>
-              <a:tr h="260510">
+              <a:tr h="266862">
                 <a:tc>
                   <a:txBody>
                     <a:bodyPr/>
                     <a:lstStyle/>
                     <a:p>
-                      <a:pPr marL="0" marR="0" lvl="0" indent="0" algn="l" defTabSz="914400" rtl="0" eaLnBrk="1" fontAlgn="auto" latinLnBrk="0" hangingPunct="1">
-                        <a:lnSpc>
-                          <a:spcPct val="100000"/>
-                        </a:lnSpc>
+                      <a:pPr marL="0" marR="0" indent="0" algn="l" rtl="0" eaLnBrk="1" fontAlgn="auto" latinLnBrk="0" hangingPunct="1">
                         <a:spcBef>
                           <a:spcPts val="0"/>
                         </a:spcBef>
                         <a:spcAft>
                           <a:spcPts val="0"/>
                         </a:spcAft>
-                        <a:buClrTx/>
-                        <a:buSzTx/>
-                        <a:buFontTx/>
-                        <a:buNone/>
-                        <a:tabLst/>
-                        <a:defRPr/>
                       </a:pPr>
                       <a:r>
-                        <a:rPr lang="en-US" sz="1100" dirty="0"/>
-                        <a:t>Vanomycin and Rocephin</a:t>
-                      </a:r>
+                        <a:rPr lang="en-US" sz="1100" kern="1200" dirty="0">
+                          <a:effectLst/>
+                        </a:rPr>
+                        <a:t>Doxycycline + Atovaquone/Proguanil (</a:t>
+                      </a:r>
+                      <a:r>
+                        <a:rPr lang="en-US" sz="1100" kern="1200" dirty="0" err="1">
+                          <a:effectLst/>
+                        </a:rPr>
+                        <a:t>Malarone</a:t>
+                      </a:r>
+                      <a:r>
+                        <a:rPr lang="en-US" sz="1100" kern="1200" dirty="0">
+                          <a:effectLst/>
+                        </a:rPr>
+                        <a:t>)</a:t>
+                      </a:r>
+                      <a:r>
+                        <a:rPr lang="en-US" sz="1100" kern="1200" baseline="0" dirty="0">
+                          <a:effectLst/>
+                        </a:rPr>
+                        <a:t> </a:t>
+                      </a:r>
+                      <a:r>
+                        <a:rPr lang="en-US" sz="1100" kern="1200" dirty="0">
+                          <a:effectLst/>
+                        </a:rPr>
+                        <a:t>(L + M)</a:t>
+                      </a:r>
+                      <a:endParaRPr lang="en-US" sz="1700" dirty="0">
+                        <a:effectLst/>
+                      </a:endParaRPr>
                     </a:p>
                   </a:txBody>
-                  <a:tcPr/>
+                  <a:tcPr marL="0" marR="0" marT="0" marB="0" anchor="ctr"/>
                 </a:tc>
                 <a:tc>
                   <a:txBody>
                     <a:bodyPr/>
                     <a:lstStyle/>
                     <a:p>
-                      <a:pPr algn="ctr"/>
-                      <a:r>
-                        <a:rPr lang="en-US" sz="1100" b="1" dirty="0">
-                          <a:solidFill>
-                            <a:srgbClr val="002060"/>
-                          </a:solidFill>
+                      <a:pPr marL="0" algn="ctr" rtl="0" eaLnBrk="1" latinLnBrk="0" hangingPunct="1">
+                        <a:spcBef>
+                          <a:spcPts val="0"/>
+                        </a:spcBef>
+                        <a:spcAft>
+                          <a:spcPts val="0"/>
+                        </a:spcAft>
+                      </a:pPr>
+                      <a:r>
+                        <a:rPr lang="en-US" sz="1100" kern="1200" dirty="0">
+                          <a:effectLst/>
                         </a:rPr>
-                        <a:t>R</a:t>
-                      </a:r>
+                        <a:t>S</a:t>
+                      </a:r>
+                      <a:endParaRPr lang="en-US" sz="1700" dirty="0">
+                        <a:effectLst/>
+                      </a:endParaRPr>
                     </a:p>
                   </a:txBody>
-                  <a:tcPr/>
+                  <a:tcPr marL="0" marR="0" marT="0" marB="0" anchor="ctr"/>
                 </a:tc>
                 <a:extLst>
                   <a:ext uri="{0D108BD9-81ED-4DB2-BD59-A6C34878D82A}">
-                    <a16:rowId xmlns:a16="http://schemas.microsoft.com/office/drawing/2014/main" val="198793815"/>
+                    <a16:rowId xmlns:a16="http://schemas.microsoft.com/office/drawing/2014/main" val="3265374869"/>
                   </a:ext>
                 </a:extLst>
               </a:tr>
-              <a:tr h="260510">
+              <a:tr h="255264">
                 <a:tc>
                   <a:txBody>
                     <a:bodyPr/>
                     <a:lstStyle/>
                     <a:p>
-                      <a:pPr marL="0" marR="0" lvl="0" indent="0" algn="l" defTabSz="914400" rtl="0" eaLnBrk="1" fontAlgn="auto" latinLnBrk="0" hangingPunct="1">
-                        <a:lnSpc>
-                          <a:spcPct val="100000"/>
-                        </a:lnSpc>
+                      <a:pPr marL="0" algn="l" rtl="0" eaLnBrk="1" fontAlgn="b" latinLnBrk="0" hangingPunct="1">
                         <a:spcBef>
                           <a:spcPts val="0"/>
                         </a:spcBef>
                         <a:spcAft>
                           <a:spcPts val="0"/>
                         </a:spcAft>
-                        <a:buClrTx/>
-                        <a:buSzTx/>
-                        <a:buFontTx/>
-                        <a:buNone/>
-                        <a:tabLst/>
-                        <a:defRPr/>
                       </a:pPr>
                       <a:r>
-                        <a:rPr lang="en-US" sz="1100" dirty="0"/>
-                        <a:t>Atovaquone/Proguanil (Malarone)</a:t>
-                      </a:r>
-                      <a:r>
-                        <a:rPr lang="en-US" sz="1100" baseline="0" dirty="0"/>
-                        <a:t> + </a:t>
-                      </a:r>
-                      <a:r>
-                        <a:rPr lang="en-US" sz="1100" dirty="0"/>
-                        <a:t>Doxycycline</a:t>
-                      </a:r>
-                      <a:endParaRPr lang="en-US" sz="1100" dirty="0">
-                        <a:latin typeface="+mn-lt"/>
+                        <a:rPr lang="en-US" sz="1100" kern="1200" dirty="0">
+                          <a:effectLst/>
+                        </a:rPr>
+                        <a:t>Doxycycline, </a:t>
+                      </a:r>
+                      <a:r>
+                        <a:rPr lang="en-US" sz="1100" kern="1200" dirty="0" err="1">
+                          <a:effectLst/>
+                        </a:rPr>
+                        <a:t>Malarone</a:t>
+                      </a:r>
+                      <a:r>
+                        <a:rPr lang="en-US" sz="1100" kern="1200" dirty="0">
+                          <a:effectLst/>
+                        </a:rPr>
+                        <a:t>, Quinine and Artesunate (L + M + N + AS)</a:t>
+                      </a:r>
+                      <a:endParaRPr lang="en-US" sz="1700" dirty="0">
+                        <a:effectLst/>
                       </a:endParaRPr>
                     </a:p>
                   </a:txBody>
-                  <a:tcPr/>
+                  <a:tcPr marL="0" marR="0" marT="0" marB="0" anchor="ctr"/>
                 </a:tc>
                 <a:tc>
                   <a:txBody>
                     <a:bodyPr/>
                     <a:lstStyle/>
                     <a:p>
-                      <a:pPr algn="ctr"/>
-                      <a:r>
-                        <a:rPr lang="en-US" sz="1100" b="1" dirty="0">
-                          <a:solidFill>
-                            <a:srgbClr val="002060"/>
-                          </a:solidFill>
+                      <a:pPr marL="0" algn="ctr" rtl="0" eaLnBrk="1" latinLnBrk="0" hangingPunct="1">
+                        <a:spcBef>
+                          <a:spcPts val="0"/>
+                        </a:spcBef>
+                        <a:spcAft>
+                          <a:spcPts val="0"/>
+                        </a:spcAft>
+                      </a:pPr>
+                      <a:r>
+                        <a:rPr lang="en-US" sz="1100" kern="1200" dirty="0">
+                          <a:effectLst/>
                         </a:rPr>
-                        <a:t>S</a:t>
-                      </a:r>
+                        <a:t>T</a:t>
+                      </a:r>
+                      <a:endParaRPr lang="en-US" sz="1700" dirty="0">
+                        <a:effectLst/>
+                      </a:endParaRPr>
                     </a:p>
                   </a:txBody>
-                  <a:tcPr/>
+                  <a:tcPr marL="0" marR="0" marT="0" marB="0" anchor="ctr"/>
                 </a:tc>
                 <a:extLst>
                   <a:ext uri="{0D108BD9-81ED-4DB2-BD59-A6C34878D82A}">
-                    <a16:rowId xmlns:a16="http://schemas.microsoft.com/office/drawing/2014/main" val="3607294121"/>
+                    <a16:rowId xmlns:a16="http://schemas.microsoft.com/office/drawing/2014/main" val="4229206252"/>
                   </a:ext>
                 </a:extLst>
               </a:tr>
-              <a:tr h="260510">
+              <a:tr h="255264">
                 <a:tc>
                   <a:txBody>
                     <a:bodyPr/>
                     <a:lstStyle/>
                     <a:p>
-                      <a:pPr algn="l" fontAlgn="b"/>
-                      <a:r>
-                        <a:rPr lang="en-US" sz="1100" b="0" u="none" strike="noStrike" dirty="0">
-                          <a:solidFill>
-                            <a:srgbClr val="000000"/>
-                          </a:solidFill>
+                      <a:pPr marL="0" algn="l" rtl="0" eaLnBrk="1" latinLnBrk="0" hangingPunct="1">
+                        <a:spcBef>
+                          <a:spcPts val="0"/>
+                        </a:spcBef>
+                        <a:spcAft>
+                          <a:spcPts val="0"/>
+                        </a:spcAft>
+                      </a:pPr>
+                      <a:r>
+                        <a:rPr lang="en-US" sz="1100" kern="1200" dirty="0">
                           <a:effectLst/>
                         </a:rPr>
-                        <a:t>Doxycycline, Malarone, Quinine and Artesunate</a:t>
-                      </a:r>
-                      <a:endParaRPr lang="en-US" sz="1100" b="0" i="0" u="none" strike="noStrike" dirty="0">
-                        <a:solidFill>
-                          <a:srgbClr val="000000"/>
-                        </a:solidFill>
+                        <a:t>Hydroxychloroquine</a:t>
+                      </a:r>
+                      <a:endParaRPr lang="en-US" sz="1700" dirty="0">
                         <a:effectLst/>
-                        <a:latin typeface="+mn-lt"/>
                       </a:endParaRPr>
                     </a:p>
                   </a:txBody>
-                  <a:tcPr/>
+                  <a:tcPr marL="0" marR="0" marT="0" marB="0" anchor="ctr"/>
                 </a:tc>
                 <a:tc>
                   <a:txBody>
                     <a:bodyPr/>
                     <a:lstStyle/>
                     <a:p>
-                      <a:pPr algn="ctr"/>
-                      <a:r>
-                        <a:rPr lang="en-US" sz="1100" b="1" dirty="0">
-                          <a:solidFill>
-                            <a:srgbClr val="002060"/>
-                          </a:solidFill>
+                      <a:pPr marL="0" algn="ctr" rtl="0" eaLnBrk="1" latinLnBrk="0" hangingPunct="1">
+                        <a:spcBef>
+                          <a:spcPts val="0"/>
+                        </a:spcBef>
+                        <a:spcAft>
+                          <a:spcPts val="0"/>
+                        </a:spcAft>
+                      </a:pPr>
+                      <a:r>
+                        <a:rPr lang="en-US" sz="1100" kern="1200" dirty="0">
+                          <a:effectLst/>
                         </a:rPr>
-                        <a:t>T</a:t>
-                      </a:r>
+                        <a:t>U</a:t>
+                      </a:r>
+                      <a:endParaRPr lang="en-US" sz="1700" dirty="0">
+                        <a:effectLst/>
+                      </a:endParaRPr>
                     </a:p>
                   </a:txBody>
-                  <a:tcPr/>
+                  <a:tcPr marL="0" marR="0" marT="0" marB="0" anchor="ctr"/>
                 </a:tc>
                 <a:extLst>
                   <a:ext uri="{0D108BD9-81ED-4DB2-BD59-A6C34878D82A}">
-                    <a16:rowId xmlns:a16="http://schemas.microsoft.com/office/drawing/2014/main" val="1714871757"/>
+                    <a16:rowId xmlns:a16="http://schemas.microsoft.com/office/drawing/2014/main" val="2301392423"/>
                   </a:ext>
                 </a:extLst>
               </a:tr>
-              <a:tr h="260510">
+              <a:tr h="255264">
                 <a:tc>
                   <a:txBody>
                     <a:bodyPr/>
                     <a:lstStyle/>
                     <a:p>
-                      <a:pPr lvl="0" algn="l">
-                        <a:buNone/>
+                      <a:pPr marL="0" algn="l" rtl="0" eaLnBrk="1" latinLnBrk="0" hangingPunct="1">
+                        <a:spcBef>
+                          <a:spcPts val="0"/>
+                        </a:spcBef>
+                        <a:spcAft>
+                          <a:spcPts val="0"/>
+                        </a:spcAft>
                       </a:pPr>
                       <a:r>
-                        <a:rPr lang="en-US" sz="1100" b="0" u="none" strike="noStrike" noProof="0" dirty="0">
+                        <a:rPr lang="en-US" sz="1100" kern="1200" dirty="0" err="1">
                           <a:effectLst/>
                         </a:rPr>
-                        <a:t>Hydroxychloroquine</a:t>
-                      </a:r>
-                      <a:endParaRPr lang="en-US" sz="1100" dirty="0"/>
+                        <a:t>Coartem</a:t>
+                      </a:r>
+                      <a:r>
+                        <a:rPr lang="en-US" sz="1100" kern="1200" dirty="0">
+                          <a:effectLst/>
+                        </a:rPr>
+                        <a:t> + Artesunate + </a:t>
+                      </a:r>
+                      <a:r>
+                        <a:rPr lang="en-US" sz="1100" kern="1200" dirty="0" err="1">
+                          <a:effectLst/>
+                        </a:rPr>
+                        <a:t>Malarone</a:t>
+                      </a:r>
+                      <a:r>
+                        <a:rPr lang="en-US" sz="1100" kern="1200" dirty="0">
+                          <a:effectLst/>
+                        </a:rPr>
+                        <a:t> (AL + AS + M)</a:t>
+                      </a:r>
+                      <a:endParaRPr lang="en-US" sz="1700" dirty="0">
+                        <a:effectLst/>
+                      </a:endParaRPr>
                     </a:p>
                   </a:txBody>
-                  <a:tcPr/>
+                  <a:tcPr marL="0" marR="0" marT="0" marB="0" anchor="ctr"/>
                 </a:tc>
                 <a:tc>
                   <a:txBody>
                     <a:bodyPr/>
                     <a:lstStyle/>
                     <a:p>
-                      <a:pPr lvl="0" algn="ctr">
-                        <a:buNone/>
+                      <a:pPr marL="0" algn="ctr" rtl="0" eaLnBrk="1" latinLnBrk="0" hangingPunct="1">
+                        <a:spcBef>
+                          <a:spcPts val="0"/>
+                        </a:spcBef>
+                        <a:spcAft>
+                          <a:spcPts val="0"/>
+                        </a:spcAft>
                       </a:pPr>
                       <a:r>
-                        <a:rPr lang="en-US" sz="1100" b="1" dirty="0">
-                          <a:solidFill>
-                            <a:srgbClr val="002060"/>
-                          </a:solidFill>
+                        <a:rPr lang="en-US" sz="1100" kern="1200" dirty="0">
+                          <a:effectLst/>
                         </a:rPr>
-                        <a:t>U</a:t>
-                      </a:r>
+                        <a:t>W</a:t>
+                      </a:r>
+                      <a:endParaRPr lang="en-US" sz="1700" dirty="0">
+                        <a:effectLst/>
+                      </a:endParaRPr>
                     </a:p>
                   </a:txBody>
-                  <a:tcPr/>
+                  <a:tcPr marL="0" marR="0" marT="0" marB="0" anchor="ctr"/>
                 </a:tc>
                 <a:extLst>
                   <a:ext uri="{0D108BD9-81ED-4DB2-BD59-A6C34878D82A}">
-                    <a16:rowId xmlns:a16="http://schemas.microsoft.com/office/drawing/2014/main" val="3630943854"/>
+                    <a16:rowId xmlns:a16="http://schemas.microsoft.com/office/drawing/2014/main" val="4283087793"/>
                   </a:ext>
                 </a:extLst>
               </a:tr>
-              <a:tr h="260510">
+              <a:tr h="255264">
                 <a:tc>
                   <a:txBody>
                     <a:bodyPr/>
                     <a:lstStyle/>
                     <a:p>
-                      <a:pPr lvl="0" algn="l">
-                        <a:buNone/>
+                      <a:pPr marL="0" algn="l" rtl="0" eaLnBrk="1" latinLnBrk="0" hangingPunct="1">
+                        <a:spcBef>
+                          <a:spcPts val="0"/>
+                        </a:spcBef>
+                        <a:spcAft>
+                          <a:spcPts val="0"/>
+                        </a:spcAft>
                       </a:pPr>
                       <a:r>
-                        <a:rPr lang="en-US" sz="1100" b="0" u="none" strike="noStrike" noProof="0" dirty="0">
+                        <a:rPr lang="en-US" sz="1100" kern="1200" dirty="0" err="1">
                           <a:effectLst/>
                         </a:rPr>
-                        <a:t>Atovaquone</a:t>
-                      </a:r>
-                      <a:endParaRPr lang="en-US" sz="1100" b="0" i="0" u="none" strike="noStrike" noProof="0" dirty="0">
+                        <a:t>Arthemether-Lumafantrine</a:t>
+                      </a:r>
+                      <a:r>
+                        <a:rPr lang="en-US" sz="1100" kern="1200" dirty="0">
+                          <a:effectLst/>
+                        </a:rPr>
+                        <a:t> (</a:t>
+                      </a:r>
+                      <a:r>
+                        <a:rPr lang="en-US" sz="1100" kern="1200" dirty="0" err="1">
+                          <a:effectLst/>
+                        </a:rPr>
+                        <a:t>Coartem</a:t>
+                      </a:r>
+                      <a:r>
+                        <a:rPr lang="en-US" sz="1100" kern="1200" dirty="0">
+                          <a:effectLst/>
+                        </a:rPr>
+                        <a:t>) + Artesunate (AL + AS) </a:t>
+                      </a:r>
+                      <a:endParaRPr lang="en-US" sz="1700" dirty="0">
                         <a:effectLst/>
                       </a:endParaRPr>
                     </a:p>
                   </a:txBody>
-                  <a:tcPr/>
+                  <a:tcPr marL="0" marR="0" marT="0" marB="0" anchor="ctr"/>
                 </a:tc>
                 <a:tc>
                   <a:txBody>
                     <a:bodyPr/>
                     <a:lstStyle/>
                     <a:p>
-                      <a:pPr lvl="0" algn="ctr">
-                        <a:buNone/>
+                      <a:pPr marL="0" algn="ctr" rtl="0" eaLnBrk="1" latinLnBrk="0" hangingPunct="1">
+                        <a:spcBef>
+                          <a:spcPts val="0"/>
+                        </a:spcBef>
+                        <a:spcAft>
+                          <a:spcPts val="0"/>
+                        </a:spcAft>
                       </a:pPr>
                       <a:r>
-                        <a:rPr lang="en-US" sz="1100" b="1" dirty="0">
-                          <a:solidFill>
-                            <a:srgbClr val="002060"/>
-                          </a:solidFill>
+                        <a:rPr lang="en-US" sz="1100" kern="1200" dirty="0">
+                          <a:effectLst/>
                         </a:rPr>
-                        <a:t>V</a:t>
-                      </a:r>
+                        <a:t>Y</a:t>
+                      </a:r>
+                      <a:endParaRPr lang="en-US" sz="1700" dirty="0">
+                        <a:effectLst/>
+                      </a:endParaRPr>
                     </a:p>
                   </a:txBody>
-                  <a:tcPr/>
+                  <a:tcPr marL="0" marR="0" marT="0" marB="0" anchor="ctr"/>
                 </a:tc>
                 <a:extLst>
                   <a:ext uri="{0D108BD9-81ED-4DB2-BD59-A6C34878D82A}">
-                    <a16:rowId xmlns:a16="http://schemas.microsoft.com/office/drawing/2014/main" val="1462635073"/>
+                    <a16:rowId xmlns:a16="http://schemas.microsoft.com/office/drawing/2014/main" val="1742251223"/>
                   </a:ext>
                 </a:extLst>
               </a:tr>
-              <a:tr h="243251">
+              <a:tr h="255264">
                 <a:tc>
                   <a:txBody>
                     <a:bodyPr/>
                     <a:lstStyle/>
                     <a:p>
-                      <a:pPr lvl="0" algn="l">
-                        <a:buNone/>
+                      <a:pPr marL="0" algn="l" rtl="0" eaLnBrk="1" latinLnBrk="0" hangingPunct="1">
+                        <a:spcBef>
+                          <a:spcPts val="0"/>
+                        </a:spcBef>
+                        <a:spcAft>
+                          <a:spcPts val="0"/>
+                        </a:spcAft>
                       </a:pPr>
                       <a:r>
-                        <a:rPr lang="en-US" sz="1100" b="0" u="none" strike="noStrike" kern="1200" dirty="0">
-                          <a:solidFill>
-                            <a:schemeClr val="tx1"/>
-                          </a:solidFill>
+                        <a:rPr lang="en-US" sz="1100" kern="1200" dirty="0">
                           <a:effectLst/>
                         </a:rPr>
-                        <a:t>Atovaquone/Proguanil (Malarone) + AL (Coartem) + Artesunate </a:t>
-                      </a:r>
-                      <a:endParaRPr lang="en-US" sz="1100" b="0" i="0" u="none" strike="noStrike" noProof="0" dirty="0">
+                        <a:t>Chloroquine + primaquine (CQ + primaquine)</a:t>
+                      </a:r>
+                      <a:endParaRPr lang="en-US" sz="1700" dirty="0">
                         <a:effectLst/>
                       </a:endParaRPr>
                     </a:p>
                   </a:txBody>
-                  <a:tcPr/>
+                  <a:tcPr marL="0" marR="0" marT="0" marB="0" anchor="ctr"/>
                 </a:tc>
                 <a:tc>
                   <a:txBody>
                     <a:bodyPr/>
                     <a:lstStyle/>
                     <a:p>
-                      <a:pPr lvl="0" algn="ctr">
-                        <a:buNone/>
+                      <a:pPr marL="0" algn="ctr" rtl="0" eaLnBrk="1" latinLnBrk="0" hangingPunct="1">
+                        <a:spcBef>
+                          <a:spcPts val="0"/>
+                        </a:spcBef>
+                        <a:spcAft>
+                          <a:spcPts val="0"/>
+                        </a:spcAft>
                       </a:pPr>
                       <a:r>
-                        <a:rPr lang="en-US" sz="1100" b="1" dirty="0">
-                          <a:solidFill>
-                            <a:srgbClr val="002060"/>
-                          </a:solidFill>
+                        <a:rPr lang="en-US" sz="1100" kern="1200" dirty="0">
+                          <a:effectLst/>
                         </a:rPr>
-                        <a:t>W</a:t>
-                      </a:r>
+                        <a:t>Z </a:t>
+                      </a:r>
+                      <a:endParaRPr lang="en-US" sz="1700" dirty="0">
+                        <a:effectLst/>
+                      </a:endParaRPr>
                     </a:p>
                   </a:txBody>
-                  <a:tcPr/>
+                  <a:tcPr marL="0" marR="0" marT="0" marB="0" anchor="ctr"/>
                 </a:tc>
                 <a:extLst>
                   <a:ext uri="{0D108BD9-81ED-4DB2-BD59-A6C34878D82A}">
-                    <a16:rowId xmlns:a16="http://schemas.microsoft.com/office/drawing/2014/main" val="948813210"/>
+                    <a16:rowId xmlns:a16="http://schemas.microsoft.com/office/drawing/2014/main" val="492526880"/>
                   </a:ext>
                 </a:extLst>
               </a:tr>
-              <a:tr h="260510">
+              <a:tr h="255264">
                 <a:tc>
                   <a:txBody>
                     <a:bodyPr/>
                     <a:lstStyle/>
                     <a:p>
-                      <a:pPr lvl="0" algn="l">
-                        <a:buNone/>
+                      <a:pPr marL="0" algn="l" rtl="0" eaLnBrk="1" fontAlgn="b" latinLnBrk="0" hangingPunct="1">
+                        <a:spcBef>
+                          <a:spcPts val="0"/>
+                        </a:spcBef>
+                        <a:spcAft>
+                          <a:spcPts val="0"/>
+                        </a:spcAft>
                       </a:pPr>
                       <a:r>
-                        <a:rPr lang="en-US" sz="1100" b="0" u="none" strike="noStrike" kern="1200" dirty="0">
-                          <a:solidFill>
-                            <a:schemeClr val="tx1"/>
-                          </a:solidFill>
+                        <a:rPr lang="en-US" sz="1100" kern="1200" dirty="0">
                           <a:effectLst/>
                         </a:rPr>
-                        <a:t>Arthemether-Lumafantrine (Coartem) + Artesunate </a:t>
-                      </a:r>
-                      <a:endParaRPr lang="en-US" sz="1100" b="0" i="0" u="none" strike="noStrike" noProof="0" dirty="0">
+                        <a:t>Artesunate, </a:t>
+                      </a:r>
+                      <a:r>
+                        <a:rPr lang="en-US" sz="1100" kern="1200" dirty="0" err="1">
+                          <a:effectLst/>
+                        </a:rPr>
+                        <a:t>Malarone</a:t>
+                      </a:r>
+                      <a:r>
+                        <a:rPr lang="en-US" sz="1100" kern="1200" dirty="0">
+                          <a:effectLst/>
+                        </a:rPr>
+                        <a:t> (AS + M)</a:t>
+                      </a:r>
+                      <a:endParaRPr lang="en-US" sz="1700" dirty="0">
                         <a:effectLst/>
                       </a:endParaRPr>
                     </a:p>
                   </a:txBody>
-                  <a:tcPr/>
+                  <a:tcPr marL="0" marR="0" marT="0" marB="0" anchor="ctr"/>
                 </a:tc>
                 <a:tc>
                   <a:txBody>
                     <a:bodyPr/>
                     <a:lstStyle/>
                     <a:p>
-                      <a:pPr lvl="0" algn="ctr">
-                        <a:buNone/>
+                      <a:pPr marL="0" algn="ctr" rtl="0" eaLnBrk="1" latinLnBrk="0" hangingPunct="1">
+                        <a:spcBef>
+                          <a:spcPts val="0"/>
+                        </a:spcBef>
+                        <a:spcAft>
+                          <a:spcPts val="0"/>
+                        </a:spcAft>
                       </a:pPr>
                       <a:r>
-                        <a:rPr lang="en-US" sz="1100" b="1" dirty="0">
-                          <a:solidFill>
-                            <a:srgbClr val="002060"/>
-                          </a:solidFill>
+                        <a:rPr lang="en-US" sz="1100" kern="1200" dirty="0">
+                          <a:effectLst/>
                         </a:rPr>
-                        <a:t>Y</a:t>
-                      </a:r>
+                        <a:t>a</a:t>
+                      </a:r>
+                      <a:endParaRPr lang="en-US" sz="1700" dirty="0">
+                        <a:effectLst/>
+                      </a:endParaRPr>
                     </a:p>
                   </a:txBody>
-                  <a:tcPr/>
+                  <a:tcPr marL="0" marR="0" marT="0" marB="0" anchor="ctr"/>
                 </a:tc>
                 <a:extLst>
                   <a:ext uri="{0D108BD9-81ED-4DB2-BD59-A6C34878D82A}">
-                    <a16:rowId xmlns:a16="http://schemas.microsoft.com/office/drawing/2014/main" val="3302080497"/>
+                    <a16:rowId xmlns:a16="http://schemas.microsoft.com/office/drawing/2014/main" val="2921080472"/>
+                  </a:ext>
+                </a:extLst>
+              </a:tr>
+              <a:tr h="255264">
+                <a:tc>
+                  <a:txBody>
+                    <a:bodyPr/>
+                    <a:lstStyle/>
+                    <a:p>
+                      <a:pPr marL="0" algn="l" rtl="0" eaLnBrk="1" latinLnBrk="0" hangingPunct="1">
+                        <a:spcBef>
+                          <a:spcPts val="0"/>
+                        </a:spcBef>
+                        <a:spcAft>
+                          <a:spcPts val="0"/>
+                        </a:spcAft>
+                      </a:pPr>
+                      <a:r>
+                        <a:rPr lang="en-US" sz="1100" kern="1200" dirty="0">
+                          <a:effectLst/>
+                        </a:rPr>
+                        <a:t>Artesunate + D</a:t>
+                      </a:r>
+                      <a:r>
+                        <a:rPr lang="en-US" sz="1100" b="0" i="0" u="none" strike="noStrike" kern="1200" noProof="0" dirty="0">
+                          <a:effectLst/>
+                          <a:latin typeface="Rockwell"/>
+                        </a:rPr>
+                        <a:t>oxycycline</a:t>
+                      </a:r>
+                      <a:r>
+                        <a:rPr lang="en-US" sz="1100" kern="1200" dirty="0">
+                          <a:effectLst/>
+                        </a:rPr>
+                        <a:t> (AS +L)</a:t>
+                      </a:r>
+                      <a:endParaRPr lang="en-US" sz="1700" dirty="0">
+                        <a:effectLst/>
+                      </a:endParaRPr>
+                    </a:p>
+                  </a:txBody>
+                  <a:tcPr marL="0" marR="0" marT="0" marB="0" anchor="ctr"/>
+                </a:tc>
+                <a:tc>
+                  <a:txBody>
+                    <a:bodyPr/>
+                    <a:lstStyle/>
+                    <a:p>
+                      <a:pPr marL="0" algn="ctr" rtl="0" eaLnBrk="1" latinLnBrk="0" hangingPunct="1">
+                        <a:spcBef>
+                          <a:spcPts val="0"/>
+                        </a:spcBef>
+                        <a:spcAft>
+                          <a:spcPts val="0"/>
+                        </a:spcAft>
+                      </a:pPr>
+                      <a:r>
+                        <a:rPr lang="en-US" sz="1100" kern="1200" dirty="0">
+                          <a:effectLst/>
+                        </a:rPr>
+                        <a:t>b</a:t>
+                      </a:r>
+                      <a:endParaRPr lang="en-US" sz="1700" dirty="0">
+                        <a:effectLst/>
+                      </a:endParaRPr>
+                    </a:p>
+                  </a:txBody>
+                  <a:tcPr marL="0" marR="0" marT="0" marB="0" anchor="ctr"/>
+                </a:tc>
+                <a:extLst>
+                  <a:ext uri="{0D108BD9-81ED-4DB2-BD59-A6C34878D82A}">
+                    <a16:rowId xmlns:a16="http://schemas.microsoft.com/office/drawing/2014/main" val="242454076"/>
+                  </a:ext>
+                </a:extLst>
+              </a:tr>
+              <a:tr h="255264">
+                <a:tc>
+                  <a:txBody>
+                    <a:bodyPr/>
+                    <a:lstStyle/>
+                    <a:p>
+                      <a:pPr marL="0" lvl="0" algn="l">
+                        <a:spcBef>
+                          <a:spcPts val="0"/>
+                        </a:spcBef>
+                        <a:spcAft>
+                          <a:spcPts val="0"/>
+                        </a:spcAft>
+                        <a:buNone/>
+                      </a:pPr>
+                      <a:r>
+                        <a:rPr lang="en-US" sz="1100" b="0" i="0" u="none" strike="noStrike" kern="1200" noProof="0" dirty="0">
+                          <a:effectLst/>
+                          <a:latin typeface="Rockwell"/>
+                        </a:rPr>
+                        <a:t>Artesunate (AS) only</a:t>
+                      </a:r>
+                      <a:endParaRPr lang="en-US" sz="1700" dirty="0"/>
+                    </a:p>
+                  </a:txBody>
+                  <a:tcPr marL="0" marR="0" marT="0" marB="0" anchor="ctr"/>
+                </a:tc>
+                <a:tc>
+                  <a:txBody>
+                    <a:bodyPr/>
+                    <a:lstStyle/>
+                    <a:p>
+                      <a:pPr marL="0" lvl="0" algn="ctr">
+                        <a:spcBef>
+                          <a:spcPts val="0"/>
+                        </a:spcBef>
+                        <a:spcAft>
+                          <a:spcPts val="0"/>
+                        </a:spcAft>
+                        <a:buNone/>
+                      </a:pPr>
+                      <a:r>
+                        <a:rPr lang="en-US" sz="1100" kern="1200" dirty="0">
+                          <a:effectLst/>
+                        </a:rPr>
+                        <a:t>c</a:t>
+                      </a:r>
+                    </a:p>
+                  </a:txBody>
+                  <a:tcPr marL="0" marR="0" marT="0" marB="0" anchor="ctr"/>
+                </a:tc>
+                <a:extLst>
+                  <a:ext uri="{0D108BD9-81ED-4DB2-BD59-A6C34878D82A}">
+                    <a16:rowId xmlns:a16="http://schemas.microsoft.com/office/drawing/2014/main" val="3869924191"/>
                   </a:ext>
                 </a:extLst>
               </a:tr>
@@ -10795,14 +11242,14 @@
           <p:nvPr>
             <p:extLst>
               <p:ext uri="{D42A27DB-BD31-4B8C-83A1-F6EECF244321}">
-                <p14:modId xmlns:p14="http://schemas.microsoft.com/office/powerpoint/2010/main" val="3664095343"/>
+                <p14:modId xmlns:p14="http://schemas.microsoft.com/office/powerpoint/2010/main" val="1023601050"/>
               </p:ext>
             </p:extLst>
           </p:nvPr>
         </p:nvGraphicFramePr>
         <p:xfrm>
           <a:off x="528320" y="1102360"/>
-          <a:ext cx="7547248" cy="3440430"/>
+          <a:ext cx="8650784" cy="3440430"/>
         </p:xfrm>
         <a:graphic>
           <a:graphicData uri="http://schemas.openxmlformats.org/drawingml/2006/table">
@@ -10811,7 +11258,7 @@
                 <a:tableStyleId>{9D7B26C5-4107-4FEC-AEDC-1716B250A1EF}</a:tableStyleId>
               </a:tblPr>
               <a:tblGrid>
-                <a:gridCol w="4601368">
+                <a:gridCol w="5704904">
                   <a:extLst>
                     <a:ext uri="{9D8B030D-6E8A-4147-A177-3AD203B41FA5}">
                       <a16:colId xmlns:a16="http://schemas.microsoft.com/office/drawing/2014/main" val="3315454412"/>
@@ -10932,19 +11379,19 @@
                         <a:rPr lang="en-US" sz="1800" i="1" u="none" strike="noStrike" dirty="0">
                           <a:effectLst/>
                         </a:rPr>
-                        <a:t>k13, crt, mdr1, </a:t>
+                        <a:t>Pfk13, Pfcrt, Pfmdr1, </a:t>
                       </a:r>
                       <a:r>
                         <a:rPr lang="en-US" sz="1800" i="1" u="none" strike="noStrike" dirty="0" err="1">
                           <a:effectLst/>
                         </a:rPr>
-                        <a:t>cytB</a:t>
+                        <a:t>PfcytB</a:t>
                       </a:r>
                       <a:r>
                         <a:rPr lang="en-US" sz="1800" i="1" u="none" strike="noStrike" dirty="0">
                           <a:effectLst/>
                         </a:rPr>
-                        <a:t>, dhps, dhfr</a:t>
+                        <a:t>, Pfdhps, Pfdhfr</a:t>
                       </a:r>
                       <a:endParaRPr lang="en-US" sz="1800" b="0" i="1" u="none" strike="noStrike" dirty="0">
                         <a:solidFill>
@@ -11048,13 +11495,13 @@
                         <a:rPr lang="en-US" sz="1800" i="1" u="none" strike="noStrike" dirty="0">
                           <a:effectLst/>
                         </a:rPr>
-                        <a:t>k13</a:t>
+                        <a:t>Pfk13</a:t>
                       </a:r>
                       <a:r>
                         <a:rPr lang="en-US" sz="1800" u="none" strike="noStrike" dirty="0">
                           <a:effectLst/>
                         </a:rPr>
-                        <a:t>, dhps, dhfr</a:t>
+                        <a:t>, Pfdhps, Pfdhfr</a:t>
                       </a:r>
                     </a:p>
                   </a:txBody>
@@ -11117,7 +11564,7 @@
                         <a:rPr lang="en-US" sz="1800" i="1" u="none" strike="noStrike" dirty="0">
                           <a:effectLst/>
                         </a:rPr>
-                        <a:t>dhps, dhfr</a:t>
+                        <a:t>Pfdhps, Pfdhfr</a:t>
                       </a:r>
                       <a:endParaRPr lang="en-US" sz="1800" b="0" i="1" u="none" strike="noStrike" dirty="0">
                         <a:solidFill>
@@ -11221,7 +11668,7 @@
                         <a:rPr lang="en-US" sz="1800" i="1" u="none" strike="noStrike" dirty="0">
                           <a:effectLst/>
                         </a:rPr>
-                        <a:t>k13</a:t>
+                        <a:t>Pfk13</a:t>
                       </a:r>
                     </a:p>
                   </a:txBody>
@@ -11300,13 +11747,13 @@
                         <a:rPr lang="en-US" sz="1800" i="1" u="none" strike="noStrike" dirty="0">
                           <a:effectLst/>
                         </a:rPr>
-                        <a:t>k13, crt, </a:t>
+                        <a:t>Pfk13, Pfcrt, </a:t>
                       </a:r>
                       <a:r>
                         <a:rPr lang="en-US" sz="1800" i="1" u="none" strike="noStrike" dirty="0" err="1">
                           <a:effectLst/>
                         </a:rPr>
-                        <a:t>mdr</a:t>
+                        <a:t>Pfmdr</a:t>
                       </a:r>
                       <a:r>
                         <a:rPr lang="en-US" sz="1800" i="1" u="none" strike="noStrike" dirty="0">
@@ -11318,13 +11765,13 @@
                         <a:rPr lang="en-US" sz="1800" i="1" u="none" strike="noStrike" dirty="0" err="1">
                           <a:effectLst/>
                         </a:rPr>
-                        <a:t>cytoB</a:t>
+                        <a:t>PfcytoB</a:t>
                       </a:r>
                       <a:r>
                         <a:rPr lang="en-US" sz="1800" i="1" u="none" strike="noStrike" dirty="0">
                           <a:effectLst/>
                         </a:rPr>
-                        <a:t>, dhps, dhfr, cpmp, pfs47</a:t>
+                        <a:t>, Pfdhps, Pfdhfr, Pfcpmp, Pfs47</a:t>
                       </a:r>
                       <a:endParaRPr lang="en-US" sz="1800" b="0" i="1" u="none" strike="noStrike" dirty="0">
                         <a:solidFill>
@@ -11641,14 +12088,14 @@
           <p:nvPr>
             <p:extLst>
               <p:ext uri="{D42A27DB-BD31-4B8C-83A1-F6EECF244321}">
-                <p14:modId xmlns:p14="http://schemas.microsoft.com/office/powerpoint/2010/main" val="279557201"/>
+                <p14:modId xmlns:p14="http://schemas.microsoft.com/office/powerpoint/2010/main" val="2739985943"/>
               </p:ext>
             </p:extLst>
           </p:nvPr>
         </p:nvGraphicFramePr>
         <p:xfrm>
           <a:off x="528320" y="5028781"/>
-          <a:ext cx="7080740" cy="1394460"/>
+          <a:ext cx="7203647" cy="1394460"/>
         </p:xfrm>
         <a:graphic>
           <a:graphicData uri="http://schemas.openxmlformats.org/drawingml/2006/table">
@@ -11720,7 +12167,7 @@
                     </a:ext>
                   </a:extLst>
                 </a:gridCol>
-                <a:gridCol w="708074">
+                <a:gridCol w="830981">
                   <a:extLst>
                     <a:ext uri="{9D8B030D-6E8A-4147-A177-3AD203B41FA5}">
                       <a16:colId xmlns:a16="http://schemas.microsoft.com/office/drawing/2014/main" val="1706033998"/>
@@ -11751,7 +12198,7 @@
                       <a:pPr algn="ctr"/>
                       <a:r>
                         <a:rPr lang="en-US" sz="1050" i="1" dirty="0"/>
-                        <a:t>k13</a:t>
+                        <a:t>Pfk13</a:t>
                       </a:r>
                     </a:p>
                   </a:txBody>
@@ -11765,7 +12212,7 @@
                       <a:pPr algn="ctr"/>
                       <a:r>
                         <a:rPr lang="en-US" sz="1050" i="1" dirty="0"/>
-                        <a:t>crt</a:t>
+                        <a:t>Pfcrt</a:t>
                       </a:r>
                       <a:endParaRPr lang="en-US" sz="1050" dirty="0"/>
                     </a:p>
@@ -11780,7 +12227,7 @@
                       <a:pPr algn="ctr"/>
                       <a:r>
                         <a:rPr lang="en-US" sz="1050" i="1" dirty="0"/>
-                        <a:t>mdr1</a:t>
+                        <a:t>Pfmdr1</a:t>
                       </a:r>
                       <a:endParaRPr lang="en-US" sz="1050" dirty="0"/>
                     </a:p>
@@ -11795,7 +12242,7 @@
                       <a:pPr algn="ctr"/>
                       <a:r>
                         <a:rPr lang="en-US" sz="1050" i="1" dirty="0"/>
-                        <a:t>cytb</a:t>
+                        <a:t>Pfcytb</a:t>
                       </a:r>
                       <a:endParaRPr lang="en-US" sz="1050" dirty="0"/>
                     </a:p>
@@ -11810,7 +12257,7 @@
                       <a:pPr algn="ctr"/>
                       <a:r>
                         <a:rPr lang="en-US" sz="1050" i="1" dirty="0"/>
-                        <a:t>dhps</a:t>
+                        <a:t>Pfdhps</a:t>
                       </a:r>
                       <a:endParaRPr lang="en-US" sz="1050" dirty="0"/>
                     </a:p>
@@ -11825,7 +12272,7 @@
                       <a:pPr algn="ctr"/>
                       <a:r>
                         <a:rPr lang="en-US" sz="1050" i="1" dirty="0"/>
-                        <a:t>dhfr</a:t>
+                        <a:t>Pfdhfr</a:t>
                       </a:r>
                       <a:endParaRPr lang="en-US" sz="1050" dirty="0"/>
                     </a:p>
@@ -11840,7 +12287,7 @@
                       <a:pPr algn="ctr"/>
                       <a:r>
                         <a:rPr lang="en-US" sz="1050" dirty="0"/>
-                        <a:t>cpmp</a:t>
+                        <a:t>Pfcpmp</a:t>
                       </a:r>
                     </a:p>
                   </a:txBody>
@@ -11854,7 +12301,7 @@
                       <a:pPr algn="ctr"/>
                       <a:r>
                         <a:rPr lang="en-US" sz="1050" i="1" dirty="0"/>
-                        <a:t>pfs47</a:t>
+                        <a:t>Pfs47</a:t>
                       </a:r>
                     </a:p>
                   </a:txBody>
@@ -11867,9 +12314,10 @@
                     <a:p>
                       <a:pPr algn="ctr"/>
                       <a:r>
-                        <a:rPr lang="en-US" sz="1050" dirty="0"/>
-                        <a:t>celTOS</a:t>
-                      </a:r>
+                        <a:rPr lang="en-US" sz="1050" dirty="0" err="1"/>
+                        <a:t>PfcelTOS</a:t>
+                      </a:r>
+                      <a:endParaRPr lang="en-US" sz="1050" dirty="0"/>
                     </a:p>
                   </a:txBody>
                   <a:tcPr anchor="ctr"/>

</xml_diff>